<commit_message>
Final Commit before start
</commit_message>
<xml_diff>
--- a/Установка_JDK_Настройка_IDE_Основы_ООП_JAVA.pptx
+++ b/Установка_JDK_Настройка_IDE_Основы_ООП_JAVA.pptx
@@ -158,7 +158,7 @@
   </p:defaultTextStyle>
   <p:extLst>
     <p:ext uri="{EFAFB233-063F-42B5-8137-9DF3F51BA10A}">
-      <p15:sldGuideLst xmlns:p15="http://schemas.microsoft.com/office/powerpoint/2012/main" xmlns="">
+      <p15:sldGuideLst xmlns="" xmlns:p15="http://schemas.microsoft.com/office/powerpoint/2012/main">
         <p15:guide id="1" orient="horz" pos="2160">
           <p15:clr>
             <a:srgbClr val="A4A3A4"/>
@@ -5890,8 +5890,321 @@
                 <a:ea typeface="+mn-ea"/>
                 <a:cs typeface="+mn-cs"/>
               </a:rPr>
-              <a:t>javac –version</a:t>
-            </a:r>
+              <a:t>javac </a:t>
+            </a:r>
+            <a:r>
+              <a:rPr lang="ru-RU" sz="1200" b="0" i="0" kern="1200">
+                <a:solidFill>
+                  <a:schemeClr val="tx1"/>
+                </a:solidFill>
+                <a:effectLst/>
+                <a:latin typeface="+mn-lt"/>
+                <a:ea typeface="+mn-ea"/>
+                <a:cs typeface="+mn-cs"/>
+              </a:rPr>
+              <a:t>–</a:t>
+            </a:r>
+            <a:r>
+              <a:rPr lang="ru-RU" sz="1200" b="0" i="0" kern="1200" smtClean="0">
+                <a:solidFill>
+                  <a:schemeClr val="tx1"/>
+                </a:solidFill>
+                <a:effectLst/>
+                <a:latin typeface="+mn-lt"/>
+                <a:ea typeface="+mn-ea"/>
+                <a:cs typeface="+mn-cs"/>
+              </a:rPr>
+              <a:t>version</a:t>
+            </a:r>
+          </a:p>
+          <a:p>
+            <a:pPr lvl="2"/>
+            <a:endParaRPr lang="ru-RU" sz="1200" b="0" i="0" kern="1200" smtClean="0">
+              <a:solidFill>
+                <a:schemeClr val="tx1"/>
+              </a:solidFill>
+              <a:effectLst/>
+              <a:latin typeface="+mn-lt"/>
+              <a:ea typeface="+mn-ea"/>
+              <a:cs typeface="+mn-cs"/>
+            </a:endParaRPr>
+          </a:p>
+          <a:p>
+            <a:r>
+              <a:rPr lang="ru-RU" sz="1200" b="1" i="0" kern="1200" smtClean="0">
+                <a:solidFill>
+                  <a:schemeClr val="tx1"/>
+                </a:solidFill>
+                <a:effectLst/>
+                <a:latin typeface="+mn-lt"/>
+                <a:ea typeface="+mn-ea"/>
+                <a:cs typeface="+mn-cs"/>
+              </a:rPr>
+              <a:t>Java Development Kit (JDK)</a:t>
+            </a:r>
+          </a:p>
+          <a:p>
+            <a:r>
+              <a:rPr lang="ru-RU" sz="1200" b="1" i="0" kern="1200" smtClean="0">
+                <a:solidFill>
+                  <a:schemeClr val="tx1"/>
+                </a:solidFill>
+                <a:effectLst/>
+                <a:latin typeface="+mn-lt"/>
+                <a:ea typeface="+mn-ea"/>
+                <a:cs typeface="+mn-cs"/>
+              </a:rPr>
+              <a:t>Описание</a:t>
+            </a:r>
+          </a:p>
+          <a:p>
+            <a:r>
+              <a:rPr lang="ru-RU" sz="1200" b="0" i="0" kern="1200" smtClean="0">
+                <a:solidFill>
+                  <a:schemeClr val="tx1"/>
+                </a:solidFill>
+                <a:effectLst/>
+                <a:latin typeface="+mn-lt"/>
+                <a:ea typeface="+mn-ea"/>
+                <a:cs typeface="+mn-cs"/>
+              </a:rPr>
+              <a:t>Java Development Kit (JDK) — это набор инструментов, необходимых для разработки и запуска приложений на языке Java. JDK включает в себя компилятор, инструменты для отладки, инструменты для создания документации, а также саму Java Runtime Environment (JRE), которая необходима для выполнения Java-программ.</a:t>
+            </a:r>
+          </a:p>
+          <a:p>
+            <a:r>
+              <a:rPr lang="ru-RU" sz="1200" b="1" i="0" kern="1200" smtClean="0">
+                <a:solidFill>
+                  <a:schemeClr val="tx1"/>
+                </a:solidFill>
+                <a:effectLst/>
+                <a:latin typeface="+mn-lt"/>
+                <a:ea typeface="+mn-ea"/>
+                <a:cs typeface="+mn-cs"/>
+              </a:rPr>
+              <a:t>Основные компоненты JDK</a:t>
+            </a:r>
+          </a:p>
+          <a:p>
+            <a:r>
+              <a:rPr lang="ru-RU" sz="1200" b="1" i="0" kern="1200" smtClean="0">
+                <a:solidFill>
+                  <a:schemeClr val="tx1"/>
+                </a:solidFill>
+                <a:effectLst/>
+                <a:latin typeface="+mn-lt"/>
+                <a:ea typeface="+mn-ea"/>
+                <a:cs typeface="+mn-cs"/>
+              </a:rPr>
+              <a:t>Java Compiler (javac)</a:t>
+            </a:r>
+            <a:r>
+              <a:rPr lang="ru-RU" sz="1200" b="0" i="0" kern="1200" smtClean="0">
+                <a:solidFill>
+                  <a:schemeClr val="tx1"/>
+                </a:solidFill>
+                <a:effectLst/>
+                <a:latin typeface="+mn-lt"/>
+                <a:ea typeface="+mn-ea"/>
+                <a:cs typeface="+mn-cs"/>
+              </a:rPr>
+              <a:t>:</a:t>
+            </a:r>
+          </a:p>
+          <a:p>
+            <a:pPr lvl="1"/>
+            <a:r>
+              <a:rPr lang="ru-RU" sz="1200" b="0" i="0" kern="1200" smtClean="0">
+                <a:solidFill>
+                  <a:schemeClr val="tx1"/>
+                </a:solidFill>
+                <a:effectLst/>
+                <a:latin typeface="+mn-lt"/>
+                <a:ea typeface="+mn-ea"/>
+                <a:cs typeface="+mn-cs"/>
+              </a:rPr>
+              <a:t>Компилирует исходный код Java (файлы .java) в байт-код (файлы .class), который может быть выполнен Java Virtual Machine (JVM).</a:t>
+            </a:r>
+          </a:p>
+          <a:p>
+            <a:r>
+              <a:rPr lang="ru-RU" sz="1200" b="1" i="0" kern="1200" smtClean="0">
+                <a:solidFill>
+                  <a:schemeClr val="tx1"/>
+                </a:solidFill>
+                <a:effectLst/>
+                <a:latin typeface="+mn-lt"/>
+                <a:ea typeface="+mn-ea"/>
+                <a:cs typeface="+mn-cs"/>
+              </a:rPr>
+              <a:t>Java Runtime Environment (JRE)</a:t>
+            </a:r>
+            <a:r>
+              <a:rPr lang="ru-RU" sz="1200" b="0" i="0" kern="1200" smtClean="0">
+                <a:solidFill>
+                  <a:schemeClr val="tx1"/>
+                </a:solidFill>
+                <a:effectLst/>
+                <a:latin typeface="+mn-lt"/>
+                <a:ea typeface="+mn-ea"/>
+                <a:cs typeface="+mn-cs"/>
+              </a:rPr>
+              <a:t>:</a:t>
+            </a:r>
+          </a:p>
+          <a:p>
+            <a:pPr lvl="1"/>
+            <a:r>
+              <a:rPr lang="ru-RU" sz="1200" b="0" i="0" kern="1200" smtClean="0">
+                <a:solidFill>
+                  <a:schemeClr val="tx1"/>
+                </a:solidFill>
+                <a:effectLst/>
+                <a:latin typeface="+mn-lt"/>
+                <a:ea typeface="+mn-ea"/>
+                <a:cs typeface="+mn-cs"/>
+              </a:rPr>
+              <a:t>Обеспечивает среду для выполнения Java-программ. JRE включает в себя JVM и стандартные библиотеки Java.</a:t>
+            </a:r>
+          </a:p>
+          <a:p>
+            <a:r>
+              <a:rPr lang="ru-RU" sz="1200" b="1" i="0" kern="1200" smtClean="0">
+                <a:solidFill>
+                  <a:schemeClr val="tx1"/>
+                </a:solidFill>
+                <a:effectLst/>
+                <a:latin typeface="+mn-lt"/>
+                <a:ea typeface="+mn-ea"/>
+                <a:cs typeface="+mn-cs"/>
+              </a:rPr>
+              <a:t>Инструменты командной строки</a:t>
+            </a:r>
+            <a:r>
+              <a:rPr lang="ru-RU" sz="1200" b="0" i="0" kern="1200" smtClean="0">
+                <a:solidFill>
+                  <a:schemeClr val="tx1"/>
+                </a:solidFill>
+                <a:effectLst/>
+                <a:latin typeface="+mn-lt"/>
+                <a:ea typeface="+mn-ea"/>
+                <a:cs typeface="+mn-cs"/>
+              </a:rPr>
+              <a:t>:</a:t>
+            </a:r>
+          </a:p>
+          <a:p>
+            <a:pPr lvl="1"/>
+            <a:r>
+              <a:rPr lang="ru-RU" sz="1200" b="0" i="0" kern="1200" smtClean="0">
+                <a:solidFill>
+                  <a:schemeClr val="tx1"/>
+                </a:solidFill>
+                <a:effectLst/>
+                <a:latin typeface="+mn-lt"/>
+                <a:ea typeface="+mn-ea"/>
+                <a:cs typeface="+mn-cs"/>
+              </a:rPr>
+              <a:t>java: запускает Java-программы.</a:t>
+            </a:r>
+          </a:p>
+          <a:p>
+            <a:pPr lvl="1"/>
+            <a:r>
+              <a:rPr lang="ru-RU" sz="1200" b="0" i="0" kern="1200" smtClean="0">
+                <a:solidFill>
+                  <a:schemeClr val="tx1"/>
+                </a:solidFill>
+                <a:effectLst/>
+                <a:latin typeface="+mn-lt"/>
+                <a:ea typeface="+mn-ea"/>
+                <a:cs typeface="+mn-cs"/>
+              </a:rPr>
+              <a:t>javadoc: генерирует документацию из комментариев в исходном коде.</a:t>
+            </a:r>
+          </a:p>
+          <a:p>
+            <a:pPr lvl="1"/>
+            <a:r>
+              <a:rPr lang="ru-RU" sz="1200" b="0" i="0" kern="1200" smtClean="0">
+                <a:solidFill>
+                  <a:schemeClr val="tx1"/>
+                </a:solidFill>
+                <a:effectLst/>
+                <a:latin typeface="+mn-lt"/>
+                <a:ea typeface="+mn-ea"/>
+                <a:cs typeface="+mn-cs"/>
+              </a:rPr>
+              <a:t>jar: создает и управляет Java Archive (JAR) файлами.</a:t>
+            </a:r>
+          </a:p>
+          <a:p>
+            <a:pPr lvl="1"/>
+            <a:r>
+              <a:rPr lang="ru-RU" sz="1200" b="0" i="0" kern="1200" smtClean="0">
+                <a:solidFill>
+                  <a:schemeClr val="tx1"/>
+                </a:solidFill>
+                <a:effectLst/>
+                <a:latin typeface="+mn-lt"/>
+                <a:ea typeface="+mn-ea"/>
+                <a:cs typeface="+mn-cs"/>
+              </a:rPr>
+              <a:t>jdb: отладчик Java, который помогает находить и исправлять ошибки в коде.</a:t>
+            </a:r>
+          </a:p>
+          <a:p>
+            <a:r>
+              <a:rPr lang="ru-RU" sz="1200" b="1" i="0" kern="1200" smtClean="0">
+                <a:solidFill>
+                  <a:schemeClr val="tx1"/>
+                </a:solidFill>
+                <a:effectLst/>
+                <a:latin typeface="+mn-lt"/>
+                <a:ea typeface="+mn-ea"/>
+                <a:cs typeface="+mn-cs"/>
+              </a:rPr>
+              <a:t>Стандартные библиотеки</a:t>
+            </a:r>
+            <a:r>
+              <a:rPr lang="ru-RU" sz="1200" b="0" i="0" kern="1200" smtClean="0">
+                <a:solidFill>
+                  <a:schemeClr val="tx1"/>
+                </a:solidFill>
+                <a:effectLst/>
+                <a:latin typeface="+mn-lt"/>
+                <a:ea typeface="+mn-ea"/>
+                <a:cs typeface="+mn-cs"/>
+              </a:rPr>
+              <a:t>:</a:t>
+            </a:r>
+          </a:p>
+          <a:p>
+            <a:pPr lvl="1"/>
+            <a:r>
+              <a:rPr lang="ru-RU" sz="1200" b="0" i="0" kern="1200" smtClean="0">
+                <a:solidFill>
+                  <a:schemeClr val="tx1"/>
+                </a:solidFill>
+                <a:effectLst/>
+                <a:latin typeface="+mn-lt"/>
+                <a:ea typeface="+mn-ea"/>
+                <a:cs typeface="+mn-cs"/>
+              </a:rPr>
+              <a:t>JDK включает в себя набор стандартных библиотек, которые предоставляют готовые классы и методы для выполнения различных задач, таких как работа с коллекциями, обработка ввода-вывода, работа с сетью и многопоточностью.</a:t>
+            </a:r>
+          </a:p>
+          <a:p>
+            <a:pPr marL="0" lvl="2"/>
+            <a:endParaRPr lang="ru-RU" sz="1200" b="0" i="0" kern="1200" smtClean="0">
+              <a:solidFill>
+                <a:schemeClr val="tx1"/>
+              </a:solidFill>
+              <a:effectLst/>
+              <a:latin typeface="+mn-lt"/>
+              <a:ea typeface="+mn-ea"/>
+              <a:cs typeface="+mn-cs"/>
+            </a:endParaRPr>
           </a:p>
         </p:txBody>
       </p:sp>
@@ -28092,7 +28405,7 @@
   </p:clrMapOvr>
   <p:extLst>
     <p:ext uri="{DCECCB84-F9BA-43D5-87BE-67443E8EF086}">
-      <p15:sldGuideLst xmlns:p15="http://schemas.microsoft.com/office/powerpoint/2012/main" xmlns="">
+      <p15:sldGuideLst xmlns="" xmlns:p15="http://schemas.microsoft.com/office/powerpoint/2012/main">
         <p15:guide id="1" orient="horz" pos="414" userDrawn="1">
           <p15:clr>
             <a:srgbClr val="FBAE40"/>
@@ -30478,7 +30791,7 @@
           <p:cNvPr id="4" name="Заголовок 3">
             <a:extLst>
               <a:ext uri="{FF2B5EF4-FFF2-40B4-BE49-F238E27FC236}">
-                <a16:creationId xmlns:a16="http://schemas.microsoft.com/office/drawing/2014/main" xmlns="" id="{9C7DFBB1-7C5F-C76E-ABAE-6A877B11F80A}"/>
+                <a16:creationId xmlns="" xmlns:a16="http://schemas.microsoft.com/office/drawing/2014/main" id="{9C7DFBB1-7C5F-C76E-ABAE-6A877B11F80A}"/>
               </a:ext>
             </a:extLst>
           </p:cNvPr>
@@ -30556,7 +30869,7 @@
           <p:cNvPr id="12" name="Рисунок 11">
             <a:extLst>
               <a:ext uri="{FF2B5EF4-FFF2-40B4-BE49-F238E27FC236}">
-                <a16:creationId xmlns:a16="http://schemas.microsoft.com/office/drawing/2014/main" xmlns="" id="{CCEFED24-508F-36F3-29F1-24C036E2EC1C}"/>
+                <a16:creationId xmlns="" xmlns:a16="http://schemas.microsoft.com/office/drawing/2014/main" id="{CCEFED24-508F-36F3-29F1-24C036E2EC1C}"/>
               </a:ext>
             </a:extLst>
           </p:cNvPr>
@@ -30622,7 +30935,7 @@
           <p:cNvPr id="2" name="Заголовок 1">
             <a:extLst>
               <a:ext uri="{FF2B5EF4-FFF2-40B4-BE49-F238E27FC236}">
-                <a16:creationId xmlns:a16="http://schemas.microsoft.com/office/drawing/2014/main" xmlns="" id="{F9A2C4CE-E016-E239-B40A-B2269830C351}"/>
+                <a16:creationId xmlns="" xmlns:a16="http://schemas.microsoft.com/office/drawing/2014/main" id="{F9A2C4CE-E016-E239-B40A-B2269830C351}"/>
               </a:ext>
             </a:extLst>
           </p:cNvPr>
@@ -31079,7 +31392,7 @@
           <p:cNvPr id="2" name="Заголовок 1">
             <a:extLst>
               <a:ext uri="{FF2B5EF4-FFF2-40B4-BE49-F238E27FC236}">
-                <a16:creationId xmlns:a16="http://schemas.microsoft.com/office/drawing/2014/main" xmlns="" id="{F9A2C4CE-E016-E239-B40A-B2269830C351}"/>
+                <a16:creationId xmlns="" xmlns:a16="http://schemas.microsoft.com/office/drawing/2014/main" id="{F9A2C4CE-E016-E239-B40A-B2269830C351}"/>
               </a:ext>
             </a:extLst>
           </p:cNvPr>
@@ -31311,7 +31624,7 @@
           <p:cNvPr id="2" name="Заголовок 1">
             <a:extLst>
               <a:ext uri="{FF2B5EF4-FFF2-40B4-BE49-F238E27FC236}">
-                <a16:creationId xmlns:a16="http://schemas.microsoft.com/office/drawing/2014/main" xmlns="" id="{F9A2C4CE-E016-E239-B40A-B2269830C351}"/>
+                <a16:creationId xmlns="" xmlns:a16="http://schemas.microsoft.com/office/drawing/2014/main" id="{F9A2C4CE-E016-E239-B40A-B2269830C351}"/>
               </a:ext>
             </a:extLst>
           </p:cNvPr>
@@ -32471,7 +32784,7 @@
           <p:cNvPr id="2" name="Заголовок 1">
             <a:extLst>
               <a:ext uri="{FF2B5EF4-FFF2-40B4-BE49-F238E27FC236}">
-                <a16:creationId xmlns:a16="http://schemas.microsoft.com/office/drawing/2014/main" xmlns="" id="{F9A2C4CE-E016-E239-B40A-B2269830C351}"/>
+                <a16:creationId xmlns="" xmlns:a16="http://schemas.microsoft.com/office/drawing/2014/main" id="{F9A2C4CE-E016-E239-B40A-B2269830C351}"/>
               </a:ext>
             </a:extLst>
           </p:cNvPr>
@@ -32532,7 +32845,7 @@
           <p:cNvPr id="6" name="Рисунок 5">
             <a:extLst>
               <a:ext uri="{FF2B5EF4-FFF2-40B4-BE49-F238E27FC236}">
-                <a16:creationId xmlns:a16="http://schemas.microsoft.com/office/drawing/2014/main" xmlns="" id="{A72B82A8-6B69-B09C-A14C-0DAFED81DB6C}"/>
+                <a16:creationId xmlns="" xmlns:a16="http://schemas.microsoft.com/office/drawing/2014/main" id="{A72B82A8-6B69-B09C-A14C-0DAFED81DB6C}"/>
               </a:ext>
             </a:extLst>
           </p:cNvPr>
@@ -32568,7 +32881,7 @@
           <p:cNvPr id="7" name="TextBox 6">
             <a:extLst>
               <a:ext uri="{FF2B5EF4-FFF2-40B4-BE49-F238E27FC236}">
-                <a16:creationId xmlns:a16="http://schemas.microsoft.com/office/drawing/2014/main" xmlns="" id="{852C1C50-D43B-453D-59F2-32F10DC37D3B}"/>
+                <a16:creationId xmlns="" xmlns:a16="http://schemas.microsoft.com/office/drawing/2014/main" id="{852C1C50-D43B-453D-59F2-32F10DC37D3B}"/>
               </a:ext>
             </a:extLst>
           </p:cNvPr>
@@ -32792,7 +33105,7 @@
           <p:cNvPr id="2" name="Заголовок 1">
             <a:extLst>
               <a:ext uri="{FF2B5EF4-FFF2-40B4-BE49-F238E27FC236}">
-                <a16:creationId xmlns:a16="http://schemas.microsoft.com/office/drawing/2014/main" xmlns="" id="{F9A2C4CE-E016-E239-B40A-B2269830C351}"/>
+                <a16:creationId xmlns="" xmlns:a16="http://schemas.microsoft.com/office/drawing/2014/main" id="{F9A2C4CE-E016-E239-B40A-B2269830C351}"/>
               </a:ext>
             </a:extLst>
           </p:cNvPr>
@@ -32850,7 +33163,7 @@
           <p:cNvPr id="3" name="Таблица 2">
             <a:extLst>
               <a:ext uri="{FF2B5EF4-FFF2-40B4-BE49-F238E27FC236}">
-                <a16:creationId xmlns:a16="http://schemas.microsoft.com/office/drawing/2014/main" xmlns="" id="{02AC3759-D0B4-8D76-F254-1B31C45E2E2C}"/>
+                <a16:creationId xmlns="" xmlns:a16="http://schemas.microsoft.com/office/drawing/2014/main" id="{02AC3759-D0B4-8D76-F254-1B31C45E2E2C}"/>
               </a:ext>
             </a:extLst>
           </p:cNvPr>
@@ -32877,14 +33190,14 @@
                 <a:gridCol w="2815092">
                   <a:extLst>
                     <a:ext uri="{9D8B030D-6E8A-4147-A177-3AD203B41FA5}">
-                      <a16:colId xmlns:a16="http://schemas.microsoft.com/office/drawing/2014/main" xmlns="" val="3157637562"/>
+                      <a16:colId xmlns="" xmlns:a16="http://schemas.microsoft.com/office/drawing/2014/main" val="3157637562"/>
                     </a:ext>
                   </a:extLst>
                 </a:gridCol>
                 <a:gridCol w="7837714">
                   <a:extLst>
                     <a:ext uri="{9D8B030D-6E8A-4147-A177-3AD203B41FA5}">
-                      <a16:colId xmlns:a16="http://schemas.microsoft.com/office/drawing/2014/main" xmlns="" val="2836077444"/>
+                      <a16:colId xmlns="" xmlns:a16="http://schemas.microsoft.com/office/drawing/2014/main" val="2836077444"/>
                     </a:ext>
                   </a:extLst>
                 </a:gridCol>
@@ -33034,7 +33347,7 @@
                 </a:tc>
                 <a:extLst>
                   <a:ext uri="{0D108BD9-81ED-4DB2-BD59-A6C34878D82A}">
-                    <a16:rowId xmlns:a16="http://schemas.microsoft.com/office/drawing/2014/main" xmlns="" val="2662459142"/>
+                    <a16:rowId xmlns="" xmlns:a16="http://schemas.microsoft.com/office/drawing/2014/main" val="2662459142"/>
                   </a:ext>
                 </a:extLst>
               </a:tr>
@@ -33210,7 +33523,7 @@
                 </a:tc>
                 <a:extLst>
                   <a:ext uri="{0D108BD9-81ED-4DB2-BD59-A6C34878D82A}">
-                    <a16:rowId xmlns:a16="http://schemas.microsoft.com/office/drawing/2014/main" xmlns="" val="1282064119"/>
+                    <a16:rowId xmlns="" xmlns:a16="http://schemas.microsoft.com/office/drawing/2014/main" val="1282064119"/>
                   </a:ext>
                 </a:extLst>
               </a:tr>
@@ -33386,7 +33699,7 @@
                 </a:tc>
                 <a:extLst>
                   <a:ext uri="{0D108BD9-81ED-4DB2-BD59-A6C34878D82A}">
-                    <a16:rowId xmlns:a16="http://schemas.microsoft.com/office/drawing/2014/main" xmlns="" val="2653728797"/>
+                    <a16:rowId xmlns="" xmlns:a16="http://schemas.microsoft.com/office/drawing/2014/main" val="2653728797"/>
                   </a:ext>
                 </a:extLst>
               </a:tr>
@@ -33562,7 +33875,7 @@
                 </a:tc>
                 <a:extLst>
                   <a:ext uri="{0D108BD9-81ED-4DB2-BD59-A6C34878D82A}">
-                    <a16:rowId xmlns:a16="http://schemas.microsoft.com/office/drawing/2014/main" xmlns="" val="234017061"/>
+                    <a16:rowId xmlns="" xmlns:a16="http://schemas.microsoft.com/office/drawing/2014/main" val="234017061"/>
                   </a:ext>
                 </a:extLst>
               </a:tr>
@@ -33738,7 +34051,7 @@
                 </a:tc>
                 <a:extLst>
                   <a:ext uri="{0D108BD9-81ED-4DB2-BD59-A6C34878D82A}">
-                    <a16:rowId xmlns:a16="http://schemas.microsoft.com/office/drawing/2014/main" xmlns="" val="2450366081"/>
+                    <a16:rowId xmlns="" xmlns:a16="http://schemas.microsoft.com/office/drawing/2014/main" val="2450366081"/>
                   </a:ext>
                 </a:extLst>
               </a:tr>
@@ -33914,7 +34227,7 @@
                 </a:tc>
                 <a:extLst>
                   <a:ext uri="{0D108BD9-81ED-4DB2-BD59-A6C34878D82A}">
-                    <a16:rowId xmlns:a16="http://schemas.microsoft.com/office/drawing/2014/main" xmlns="" val="1910083205"/>
+                    <a16:rowId xmlns="" xmlns:a16="http://schemas.microsoft.com/office/drawing/2014/main" val="1910083205"/>
                   </a:ext>
                 </a:extLst>
               </a:tr>
@@ -34090,7 +34403,7 @@
                 </a:tc>
                 <a:extLst>
                   <a:ext uri="{0D108BD9-81ED-4DB2-BD59-A6C34878D82A}">
-                    <a16:rowId xmlns:a16="http://schemas.microsoft.com/office/drawing/2014/main" xmlns="" val="2515677601"/>
+                    <a16:rowId xmlns="" xmlns:a16="http://schemas.microsoft.com/office/drawing/2014/main" val="2515677601"/>
                   </a:ext>
                 </a:extLst>
               </a:tr>
@@ -34254,7 +34567,7 @@
                 </a:tc>
                 <a:extLst>
                   <a:ext uri="{0D108BD9-81ED-4DB2-BD59-A6C34878D82A}">
-                    <a16:rowId xmlns:a16="http://schemas.microsoft.com/office/drawing/2014/main" xmlns="" val="3461122430"/>
+                    <a16:rowId xmlns="" xmlns:a16="http://schemas.microsoft.com/office/drawing/2014/main" val="3461122430"/>
                   </a:ext>
                 </a:extLst>
               </a:tr>
@@ -34430,7 +34743,7 @@
                 </a:tc>
                 <a:extLst>
                   <a:ext uri="{0D108BD9-81ED-4DB2-BD59-A6C34878D82A}">
-                    <a16:rowId xmlns:a16="http://schemas.microsoft.com/office/drawing/2014/main" xmlns="" val="3671542690"/>
+                    <a16:rowId xmlns="" xmlns:a16="http://schemas.microsoft.com/office/drawing/2014/main" val="3671542690"/>
                   </a:ext>
                 </a:extLst>
               </a:tr>
@@ -34594,7 +34907,7 @@
                 </a:tc>
                 <a:extLst>
                   <a:ext uri="{0D108BD9-81ED-4DB2-BD59-A6C34878D82A}">
-                    <a16:rowId xmlns:a16="http://schemas.microsoft.com/office/drawing/2014/main" xmlns="" val="1592899344"/>
+                    <a16:rowId xmlns="" xmlns:a16="http://schemas.microsoft.com/office/drawing/2014/main" val="1592899344"/>
                   </a:ext>
                 </a:extLst>
               </a:tr>
@@ -34770,7 +35083,7 @@
                 </a:tc>
                 <a:extLst>
                   <a:ext uri="{0D108BD9-81ED-4DB2-BD59-A6C34878D82A}">
-                    <a16:rowId xmlns:a16="http://schemas.microsoft.com/office/drawing/2014/main" xmlns="" val="1650272500"/>
+                    <a16:rowId xmlns="" xmlns:a16="http://schemas.microsoft.com/office/drawing/2014/main" val="1650272500"/>
                   </a:ext>
                 </a:extLst>
               </a:tr>
@@ -34925,7 +35238,7 @@
                 </a:tc>
                 <a:extLst>
                   <a:ext uri="{0D108BD9-81ED-4DB2-BD59-A6C34878D82A}">
-                    <a16:rowId xmlns:a16="http://schemas.microsoft.com/office/drawing/2014/main" xmlns="" val="2038732419"/>
+                    <a16:rowId xmlns="" xmlns:a16="http://schemas.microsoft.com/office/drawing/2014/main" val="2038732419"/>
                   </a:ext>
                 </a:extLst>
               </a:tr>
@@ -35089,7 +35402,7 @@
                 </a:tc>
                 <a:extLst>
                   <a:ext uri="{0D108BD9-81ED-4DB2-BD59-A6C34878D82A}">
-                    <a16:rowId xmlns:a16="http://schemas.microsoft.com/office/drawing/2014/main" xmlns="" val="1878408025"/>
+                    <a16:rowId xmlns="" xmlns:a16="http://schemas.microsoft.com/office/drawing/2014/main" val="1878408025"/>
                   </a:ext>
                 </a:extLst>
               </a:tr>
@@ -35265,7 +35578,7 @@
                 </a:tc>
                 <a:extLst>
                   <a:ext uri="{0D108BD9-81ED-4DB2-BD59-A6C34878D82A}">
-                    <a16:rowId xmlns:a16="http://schemas.microsoft.com/office/drawing/2014/main" xmlns="" val="968020505"/>
+                    <a16:rowId xmlns="" xmlns:a16="http://schemas.microsoft.com/office/drawing/2014/main" val="968020505"/>
                   </a:ext>
                 </a:extLst>
               </a:tr>
@@ -35308,7 +35621,7 @@
           <p:cNvPr id="2" name="Заголовок 1">
             <a:extLst>
               <a:ext uri="{FF2B5EF4-FFF2-40B4-BE49-F238E27FC236}">
-                <a16:creationId xmlns:a16="http://schemas.microsoft.com/office/drawing/2014/main" xmlns="" id="{F9A2C4CE-E016-E239-B40A-B2269830C351}"/>
+                <a16:creationId xmlns="" xmlns:a16="http://schemas.microsoft.com/office/drawing/2014/main" id="{F9A2C4CE-E016-E239-B40A-B2269830C351}"/>
               </a:ext>
             </a:extLst>
           </p:cNvPr>
@@ -35648,7 +35961,7 @@
           <p:cNvPr id="2" name="Заголовок 1">
             <a:extLst>
               <a:ext uri="{FF2B5EF4-FFF2-40B4-BE49-F238E27FC236}">
-                <a16:creationId xmlns:a16="http://schemas.microsoft.com/office/drawing/2014/main" xmlns="" id="{F9A2C4CE-E016-E239-B40A-B2269830C351}"/>
+                <a16:creationId xmlns="" xmlns:a16="http://schemas.microsoft.com/office/drawing/2014/main" id="{F9A2C4CE-E016-E239-B40A-B2269830C351}"/>
               </a:ext>
             </a:extLst>
           </p:cNvPr>
@@ -36280,7 +36593,7 @@
           <p:cNvPr id="6" name="Рисунок 5">
             <a:extLst>
               <a:ext uri="{FF2B5EF4-FFF2-40B4-BE49-F238E27FC236}">
-                <a16:creationId xmlns:a16="http://schemas.microsoft.com/office/drawing/2014/main" xmlns="" id="{DD9D037B-14FA-D124-4EC9-D39B703011CD}"/>
+                <a16:creationId xmlns="" xmlns:a16="http://schemas.microsoft.com/office/drawing/2014/main" id="{DD9D037B-14FA-D124-4EC9-D39B703011CD}"/>
               </a:ext>
             </a:extLst>
           </p:cNvPr>
@@ -36316,7 +36629,7 @@
           <p:cNvPr id="9" name="Заголовок 8">
             <a:extLst>
               <a:ext uri="{FF2B5EF4-FFF2-40B4-BE49-F238E27FC236}">
-                <a16:creationId xmlns:a16="http://schemas.microsoft.com/office/drawing/2014/main" xmlns="" id="{DF878FEC-44A2-FA4D-209E-B9DDCFCB360B}"/>
+                <a16:creationId xmlns="" xmlns:a16="http://schemas.microsoft.com/office/drawing/2014/main" id="{DF878FEC-44A2-FA4D-209E-B9DDCFCB360B}"/>
               </a:ext>
             </a:extLst>
           </p:cNvPr>
@@ -36393,7 +36706,7 @@
           <p:cNvPr id="2" name="Заголовок 1">
             <a:extLst>
               <a:ext uri="{FF2B5EF4-FFF2-40B4-BE49-F238E27FC236}">
-                <a16:creationId xmlns:a16="http://schemas.microsoft.com/office/drawing/2014/main" xmlns="" id="{F9A2C4CE-E016-E239-B40A-B2269830C351}"/>
+                <a16:creationId xmlns="" xmlns:a16="http://schemas.microsoft.com/office/drawing/2014/main" id="{F9A2C4CE-E016-E239-B40A-B2269830C351}"/>
               </a:ext>
             </a:extLst>
           </p:cNvPr>
@@ -36793,7 +37106,7 @@
           <p:cNvPr id="2" name="Заголовок 1">
             <a:extLst>
               <a:ext uri="{FF2B5EF4-FFF2-40B4-BE49-F238E27FC236}">
-                <a16:creationId xmlns:a16="http://schemas.microsoft.com/office/drawing/2014/main" xmlns="" id="{F9A2C4CE-E016-E239-B40A-B2269830C351}"/>
+                <a16:creationId xmlns="" xmlns:a16="http://schemas.microsoft.com/office/drawing/2014/main" id="{F9A2C4CE-E016-E239-B40A-B2269830C351}"/>
               </a:ext>
             </a:extLst>
           </p:cNvPr>
@@ -37107,7 +37420,7 @@
           <p:cNvPr id="2" name="Заголовок 1">
             <a:extLst>
               <a:ext uri="{FF2B5EF4-FFF2-40B4-BE49-F238E27FC236}">
-                <a16:creationId xmlns:a16="http://schemas.microsoft.com/office/drawing/2014/main" xmlns="" id="{F9A2C4CE-E016-E239-B40A-B2269830C351}"/>
+                <a16:creationId xmlns="" xmlns:a16="http://schemas.microsoft.com/office/drawing/2014/main" id="{F9A2C4CE-E016-E239-B40A-B2269830C351}"/>
               </a:ext>
             </a:extLst>
           </p:cNvPr>
@@ -37537,7 +37850,7 @@
           <p:cNvPr id="2" name="Заголовок 1">
             <a:extLst>
               <a:ext uri="{FF2B5EF4-FFF2-40B4-BE49-F238E27FC236}">
-                <a16:creationId xmlns:a16="http://schemas.microsoft.com/office/drawing/2014/main" xmlns="" id="{F9A2C4CE-E016-E239-B40A-B2269830C351}"/>
+                <a16:creationId xmlns="" xmlns:a16="http://schemas.microsoft.com/office/drawing/2014/main" id="{F9A2C4CE-E016-E239-B40A-B2269830C351}"/>
               </a:ext>
             </a:extLst>
           </p:cNvPr>
@@ -37621,7 +37934,7 @@
             <a:r>
               <a:rPr lang="ru-RU" b="1">
                 <a:solidFill>
-                  <a:srgbClr val="FF0000"/>
+                  <a:srgbClr val="FF423F"/>
                 </a:solidFill>
                 <a:latin typeface="Arial" panose="020B0604020202020204" pitchFamily="34" charset="0"/>
                 <a:cs typeface="Arial" panose="020B0604020202020204" pitchFamily="34" charset="0"/>
@@ -37631,7 +37944,7 @@
             <a:r>
               <a:rPr lang="ru-RU">
                 <a:solidFill>
-                  <a:srgbClr val="FF0000"/>
+                  <a:srgbClr val="FF423F"/>
                 </a:solidFill>
                 <a:latin typeface="Arial" panose="020B0604020202020204" pitchFamily="34" charset="0"/>
                 <a:cs typeface="Arial" panose="020B0604020202020204" pitchFamily="34" charset="0"/>
@@ -37681,22 +37994,12 @@
             <a:r>
               <a:rPr lang="ru-RU" b="1">
                 <a:solidFill>
-                  <a:srgbClr val="FF0000"/>
+                  <a:srgbClr val="FF423F"/>
                 </a:solidFill>
                 <a:latin typeface="Arial" panose="020B0604020202020204" pitchFamily="34" charset="0"/>
                 <a:cs typeface="Arial" panose="020B0604020202020204" pitchFamily="34" charset="0"/>
               </a:rPr>
-              <a:t>Структура</a:t>
-            </a:r>
-            <a:r>
-              <a:rPr lang="ru-RU">
-                <a:solidFill>
-                  <a:srgbClr val="FF0000"/>
-                </a:solidFill>
-                <a:latin typeface="Arial" panose="020B0604020202020204" pitchFamily="34" charset="0"/>
-                <a:cs typeface="Arial" panose="020B0604020202020204" pitchFamily="34" charset="0"/>
-              </a:rPr>
-              <a:t>: </a:t>
+              <a:t>Структура: </a:t>
             </a:r>
             <a:r>
               <a:rPr lang="ru-RU">
@@ -37775,22 +38078,12 @@
             <a:r>
               <a:rPr lang="ru-RU" b="1">
                 <a:solidFill>
-                  <a:srgbClr val="FF0000"/>
+                  <a:srgbClr val="FF423F"/>
                 </a:solidFill>
                 <a:latin typeface="Arial" panose="020B0604020202020204" pitchFamily="34" charset="0"/>
                 <a:cs typeface="Arial" panose="020B0604020202020204" pitchFamily="34" charset="0"/>
               </a:rPr>
-              <a:t>Основные пакеты</a:t>
-            </a:r>
-            <a:r>
-              <a:rPr lang="ru-RU">
-                <a:solidFill>
-                  <a:srgbClr val="FF0000"/>
-                </a:solidFill>
-                <a:latin typeface="Arial" panose="020B0604020202020204" pitchFamily="34" charset="0"/>
-                <a:cs typeface="Arial" panose="020B0604020202020204" pitchFamily="34" charset="0"/>
-              </a:rPr>
-              <a:t>: </a:t>
+              <a:t>Основные пакеты: </a:t>
             </a:r>
             <a:r>
               <a:rPr lang="ru-RU">
@@ -37995,7 +38288,7 @@
           <p:cNvPr id="2" name="Заголовок 1">
             <a:extLst>
               <a:ext uri="{FF2B5EF4-FFF2-40B4-BE49-F238E27FC236}">
-                <a16:creationId xmlns:a16="http://schemas.microsoft.com/office/drawing/2014/main" xmlns="" id="{F9A2C4CE-E016-E239-B40A-B2269830C351}"/>
+                <a16:creationId xmlns="" xmlns:a16="http://schemas.microsoft.com/office/drawing/2014/main" id="{F9A2C4CE-E016-E239-B40A-B2269830C351}"/>
               </a:ext>
             </a:extLst>
           </p:cNvPr>
@@ -38426,7 +38719,7 @@
           <p:cNvPr id="2" name="Заголовок 1">
             <a:extLst>
               <a:ext uri="{FF2B5EF4-FFF2-40B4-BE49-F238E27FC236}">
-                <a16:creationId xmlns:a16="http://schemas.microsoft.com/office/drawing/2014/main" xmlns="" id="{F9A2C4CE-E016-E239-B40A-B2269830C351}"/>
+                <a16:creationId xmlns="" xmlns:a16="http://schemas.microsoft.com/office/drawing/2014/main" id="{F9A2C4CE-E016-E239-B40A-B2269830C351}"/>
               </a:ext>
             </a:extLst>
           </p:cNvPr>
@@ -38776,7 +39069,7 @@
           <p:cNvPr id="2" name="Заголовок 1">
             <a:extLst>
               <a:ext uri="{FF2B5EF4-FFF2-40B4-BE49-F238E27FC236}">
-                <a16:creationId xmlns:a16="http://schemas.microsoft.com/office/drawing/2014/main" xmlns="" id="{F9A2C4CE-E016-E239-B40A-B2269830C351}"/>
+                <a16:creationId xmlns="" xmlns:a16="http://schemas.microsoft.com/office/drawing/2014/main" id="{F9A2C4CE-E016-E239-B40A-B2269830C351}"/>
               </a:ext>
             </a:extLst>
           </p:cNvPr>
@@ -39497,7 +39790,7 @@
           <p:cNvPr id="2" name="Заголовок 1">
             <a:extLst>
               <a:ext uri="{FF2B5EF4-FFF2-40B4-BE49-F238E27FC236}">
-                <a16:creationId xmlns:a16="http://schemas.microsoft.com/office/drawing/2014/main" xmlns="" id="{F9A2C4CE-E016-E239-B40A-B2269830C351}"/>
+                <a16:creationId xmlns="" xmlns:a16="http://schemas.microsoft.com/office/drawing/2014/main" id="{F9A2C4CE-E016-E239-B40A-B2269830C351}"/>
               </a:ext>
             </a:extLst>
           </p:cNvPr>
@@ -40316,7 +40609,7 @@
           <p:cNvPr id="2" name="Заголовок 1">
             <a:extLst>
               <a:ext uri="{FF2B5EF4-FFF2-40B4-BE49-F238E27FC236}">
-                <a16:creationId xmlns:a16="http://schemas.microsoft.com/office/drawing/2014/main" xmlns="" id="{F9A2C4CE-E016-E239-B40A-B2269830C351}"/>
+                <a16:creationId xmlns="" xmlns:a16="http://schemas.microsoft.com/office/drawing/2014/main" id="{F9A2C4CE-E016-E239-B40A-B2269830C351}"/>
               </a:ext>
             </a:extLst>
           </p:cNvPr>
@@ -40645,7 +40938,7 @@
           <p:cNvPr id="2" name="Заголовок 1">
             <a:extLst>
               <a:ext uri="{FF2B5EF4-FFF2-40B4-BE49-F238E27FC236}">
-                <a16:creationId xmlns:a16="http://schemas.microsoft.com/office/drawing/2014/main" xmlns="" id="{F9A2C4CE-E016-E239-B40A-B2269830C351}"/>
+                <a16:creationId xmlns="" xmlns:a16="http://schemas.microsoft.com/office/drawing/2014/main" id="{F9A2C4CE-E016-E239-B40A-B2269830C351}"/>
               </a:ext>
             </a:extLst>
           </p:cNvPr>
@@ -41008,7 +41301,7 @@
           <p:cNvPr id="9" name="Заголовок 8">
             <a:extLst>
               <a:ext uri="{FF2B5EF4-FFF2-40B4-BE49-F238E27FC236}">
-                <a16:creationId xmlns:a16="http://schemas.microsoft.com/office/drawing/2014/main" xmlns="" id="{DF878FEC-44A2-FA4D-209E-B9DDCFCB360B}"/>
+                <a16:creationId xmlns="" xmlns:a16="http://schemas.microsoft.com/office/drawing/2014/main" id="{DF878FEC-44A2-FA4D-209E-B9DDCFCB360B}"/>
               </a:ext>
             </a:extLst>
           </p:cNvPr>
@@ -41156,7 +41449,7 @@
           <p:cNvPr id="2" name="Заголовок 1">
             <a:extLst>
               <a:ext uri="{FF2B5EF4-FFF2-40B4-BE49-F238E27FC236}">
-                <a16:creationId xmlns:a16="http://schemas.microsoft.com/office/drawing/2014/main" xmlns="" id="{F9A2C4CE-E016-E239-B40A-B2269830C351}"/>
+                <a16:creationId xmlns="" xmlns:a16="http://schemas.microsoft.com/office/drawing/2014/main" id="{F9A2C4CE-E016-E239-B40A-B2269830C351}"/>
               </a:ext>
             </a:extLst>
           </p:cNvPr>
@@ -41478,7 +41771,7 @@
           <p:cNvPr id="2" name="Заголовок 1">
             <a:extLst>
               <a:ext uri="{FF2B5EF4-FFF2-40B4-BE49-F238E27FC236}">
-                <a16:creationId xmlns:a16="http://schemas.microsoft.com/office/drawing/2014/main" xmlns="" id="{F9A2C4CE-E016-E239-B40A-B2269830C351}"/>
+                <a16:creationId xmlns="" xmlns:a16="http://schemas.microsoft.com/office/drawing/2014/main" id="{F9A2C4CE-E016-E239-B40A-B2269830C351}"/>
               </a:ext>
             </a:extLst>
           </p:cNvPr>
@@ -41911,7 +42204,7 @@
           <p:cNvPr id="2" name="Заголовок 1">
             <a:extLst>
               <a:ext uri="{FF2B5EF4-FFF2-40B4-BE49-F238E27FC236}">
-                <a16:creationId xmlns:a16="http://schemas.microsoft.com/office/drawing/2014/main" xmlns="" id="{F9A2C4CE-E016-E239-B40A-B2269830C351}"/>
+                <a16:creationId xmlns="" xmlns:a16="http://schemas.microsoft.com/office/drawing/2014/main" id="{F9A2C4CE-E016-E239-B40A-B2269830C351}"/>
               </a:ext>
             </a:extLst>
           </p:cNvPr>
@@ -42257,7 +42550,7 @@
           <p:cNvPr id="2" name="Заголовок 1">
             <a:extLst>
               <a:ext uri="{FF2B5EF4-FFF2-40B4-BE49-F238E27FC236}">
-                <a16:creationId xmlns:a16="http://schemas.microsoft.com/office/drawing/2014/main" xmlns="" id="{F9A2C4CE-E016-E239-B40A-B2269830C351}"/>
+                <a16:creationId xmlns="" xmlns:a16="http://schemas.microsoft.com/office/drawing/2014/main" id="{F9A2C4CE-E016-E239-B40A-B2269830C351}"/>
               </a:ext>
             </a:extLst>
           </p:cNvPr>
@@ -42525,7 +42818,7 @@
           <p:cNvPr id="2" name="Заголовок 1">
             <a:extLst>
               <a:ext uri="{FF2B5EF4-FFF2-40B4-BE49-F238E27FC236}">
-                <a16:creationId xmlns:a16="http://schemas.microsoft.com/office/drawing/2014/main" xmlns="" id="{F9A2C4CE-E016-E239-B40A-B2269830C351}"/>
+                <a16:creationId xmlns="" xmlns:a16="http://schemas.microsoft.com/office/drawing/2014/main" id="{F9A2C4CE-E016-E239-B40A-B2269830C351}"/>
               </a:ext>
             </a:extLst>
           </p:cNvPr>
@@ -42802,7 +43095,7 @@
           <p:cNvPr id="2" name="Заголовок 1">
             <a:extLst>
               <a:ext uri="{FF2B5EF4-FFF2-40B4-BE49-F238E27FC236}">
-                <a16:creationId xmlns:a16="http://schemas.microsoft.com/office/drawing/2014/main" xmlns="" id="{F9A2C4CE-E016-E239-B40A-B2269830C351}"/>
+                <a16:creationId xmlns="" xmlns:a16="http://schemas.microsoft.com/office/drawing/2014/main" id="{F9A2C4CE-E016-E239-B40A-B2269830C351}"/>
               </a:ext>
             </a:extLst>
           </p:cNvPr>
@@ -42996,7 +43289,7 @@
           <p:cNvPr id="2" name="Заголовок 1">
             <a:extLst>
               <a:ext uri="{FF2B5EF4-FFF2-40B4-BE49-F238E27FC236}">
-                <a16:creationId xmlns:a16="http://schemas.microsoft.com/office/drawing/2014/main" xmlns="" id="{F9A2C4CE-E016-E239-B40A-B2269830C351}"/>
+                <a16:creationId xmlns="" xmlns:a16="http://schemas.microsoft.com/office/drawing/2014/main" id="{F9A2C4CE-E016-E239-B40A-B2269830C351}"/>
               </a:ext>
             </a:extLst>
           </p:cNvPr>
@@ -43282,7 +43575,7 @@
           <p:cNvPr id="2" name="Заголовок 1">
             <a:extLst>
               <a:ext uri="{FF2B5EF4-FFF2-40B4-BE49-F238E27FC236}">
-                <a16:creationId xmlns:a16="http://schemas.microsoft.com/office/drawing/2014/main" xmlns="" id="{F9A2C4CE-E016-E239-B40A-B2269830C351}"/>
+                <a16:creationId xmlns="" xmlns:a16="http://schemas.microsoft.com/office/drawing/2014/main" id="{F9A2C4CE-E016-E239-B40A-B2269830C351}"/>
               </a:ext>
             </a:extLst>
           </p:cNvPr>
@@ -43494,7 +43787,7 @@
           <p:cNvPr id="2" name="Заголовок 1">
             <a:extLst>
               <a:ext uri="{FF2B5EF4-FFF2-40B4-BE49-F238E27FC236}">
-                <a16:creationId xmlns:a16="http://schemas.microsoft.com/office/drawing/2014/main" xmlns="" id="{F9A2C4CE-E016-E239-B40A-B2269830C351}"/>
+                <a16:creationId xmlns="" xmlns:a16="http://schemas.microsoft.com/office/drawing/2014/main" id="{F9A2C4CE-E016-E239-B40A-B2269830C351}"/>
               </a:ext>
             </a:extLst>
           </p:cNvPr>
@@ -43757,7 +44050,7 @@
           <p:cNvPr id="2" name="Заголовок 1">
             <a:extLst>
               <a:ext uri="{FF2B5EF4-FFF2-40B4-BE49-F238E27FC236}">
-                <a16:creationId xmlns:a16="http://schemas.microsoft.com/office/drawing/2014/main" xmlns="" id="{F9A2C4CE-E016-E239-B40A-B2269830C351}"/>
+                <a16:creationId xmlns="" xmlns:a16="http://schemas.microsoft.com/office/drawing/2014/main" id="{F9A2C4CE-E016-E239-B40A-B2269830C351}"/>
               </a:ext>
             </a:extLst>
           </p:cNvPr>
@@ -44125,7 +44418,7 @@
           <p:cNvPr id="9" name="Заголовок 8">
             <a:extLst>
               <a:ext uri="{FF2B5EF4-FFF2-40B4-BE49-F238E27FC236}">
-                <a16:creationId xmlns:a16="http://schemas.microsoft.com/office/drawing/2014/main" xmlns="" id="{DF878FEC-44A2-FA4D-209E-B9DDCFCB360B}"/>
+                <a16:creationId xmlns="" xmlns:a16="http://schemas.microsoft.com/office/drawing/2014/main" id="{DF878FEC-44A2-FA4D-209E-B9DDCFCB360B}"/>
               </a:ext>
             </a:extLst>
           </p:cNvPr>
@@ -44334,7 +44627,7 @@
           <p:cNvPr id="2" name="Заголовок 1">
             <a:extLst>
               <a:ext uri="{FF2B5EF4-FFF2-40B4-BE49-F238E27FC236}">
-                <a16:creationId xmlns:a16="http://schemas.microsoft.com/office/drawing/2014/main" xmlns="" id="{F9A2C4CE-E016-E239-B40A-B2269830C351}"/>
+                <a16:creationId xmlns="" xmlns:a16="http://schemas.microsoft.com/office/drawing/2014/main" id="{F9A2C4CE-E016-E239-B40A-B2269830C351}"/>
               </a:ext>
             </a:extLst>
           </p:cNvPr>
@@ -44601,7 +44894,7 @@
           <p:cNvPr id="2" name="Заголовок 1">
             <a:extLst>
               <a:ext uri="{FF2B5EF4-FFF2-40B4-BE49-F238E27FC236}">
-                <a16:creationId xmlns:a16="http://schemas.microsoft.com/office/drawing/2014/main" xmlns="" id="{F9A2C4CE-E016-E239-B40A-B2269830C351}"/>
+                <a16:creationId xmlns="" xmlns:a16="http://schemas.microsoft.com/office/drawing/2014/main" id="{F9A2C4CE-E016-E239-B40A-B2269830C351}"/>
               </a:ext>
             </a:extLst>
           </p:cNvPr>
@@ -44850,7 +45143,7 @@
           <p:cNvPr id="2" name="Заголовок 1">
             <a:extLst>
               <a:ext uri="{FF2B5EF4-FFF2-40B4-BE49-F238E27FC236}">
-                <a16:creationId xmlns:a16="http://schemas.microsoft.com/office/drawing/2014/main" xmlns="" id="{F9A2C4CE-E016-E239-B40A-B2269830C351}"/>
+                <a16:creationId xmlns="" xmlns:a16="http://schemas.microsoft.com/office/drawing/2014/main" id="{F9A2C4CE-E016-E239-B40A-B2269830C351}"/>
               </a:ext>
             </a:extLst>
           </p:cNvPr>
@@ -45174,7 +45467,7 @@
           <p:cNvPr id="2" name="Заголовок 1">
             <a:extLst>
               <a:ext uri="{FF2B5EF4-FFF2-40B4-BE49-F238E27FC236}">
-                <a16:creationId xmlns:a16="http://schemas.microsoft.com/office/drawing/2014/main" xmlns="" id="{F9A2C4CE-E016-E239-B40A-B2269830C351}"/>
+                <a16:creationId xmlns="" xmlns:a16="http://schemas.microsoft.com/office/drawing/2014/main" id="{F9A2C4CE-E016-E239-B40A-B2269830C351}"/>
               </a:ext>
             </a:extLst>
           </p:cNvPr>
@@ -45724,7 +46017,7 @@
           <p:cNvPr id="2" name="Заголовок 1">
             <a:extLst>
               <a:ext uri="{FF2B5EF4-FFF2-40B4-BE49-F238E27FC236}">
-                <a16:creationId xmlns:a16="http://schemas.microsoft.com/office/drawing/2014/main" xmlns="" id="{F9A2C4CE-E016-E239-B40A-B2269830C351}"/>
+                <a16:creationId xmlns="" xmlns:a16="http://schemas.microsoft.com/office/drawing/2014/main" id="{F9A2C4CE-E016-E239-B40A-B2269830C351}"/>
               </a:ext>
             </a:extLst>
           </p:cNvPr>
@@ -45876,7 +46169,7 @@
           <p:cNvPr id="2" name="Заголовок 1">
             <a:extLst>
               <a:ext uri="{FF2B5EF4-FFF2-40B4-BE49-F238E27FC236}">
-                <a16:creationId xmlns:a16="http://schemas.microsoft.com/office/drawing/2014/main" xmlns="" id="{F9A2C4CE-E016-E239-B40A-B2269830C351}"/>
+                <a16:creationId xmlns="" xmlns:a16="http://schemas.microsoft.com/office/drawing/2014/main" id="{F9A2C4CE-E016-E239-B40A-B2269830C351}"/>
               </a:ext>
             </a:extLst>
           </p:cNvPr>
@@ -46028,7 +46321,7 @@
           <p:cNvPr id="2" name="Заголовок 1">
             <a:extLst>
               <a:ext uri="{FF2B5EF4-FFF2-40B4-BE49-F238E27FC236}">
-                <a16:creationId xmlns:a16="http://schemas.microsoft.com/office/drawing/2014/main" xmlns="" id="{F9A2C4CE-E016-E239-B40A-B2269830C351}"/>
+                <a16:creationId xmlns="" xmlns:a16="http://schemas.microsoft.com/office/drawing/2014/main" id="{F9A2C4CE-E016-E239-B40A-B2269830C351}"/>
               </a:ext>
             </a:extLst>
           </p:cNvPr>
@@ -46308,7 +46601,7 @@
           <p:cNvPr id="2" name="Заголовок 1">
             <a:extLst>
               <a:ext uri="{FF2B5EF4-FFF2-40B4-BE49-F238E27FC236}">
-                <a16:creationId xmlns:a16="http://schemas.microsoft.com/office/drawing/2014/main" xmlns="" id="{F9A2C4CE-E016-E239-B40A-B2269830C351}"/>
+                <a16:creationId xmlns="" xmlns:a16="http://schemas.microsoft.com/office/drawing/2014/main" id="{F9A2C4CE-E016-E239-B40A-B2269830C351}"/>
               </a:ext>
             </a:extLst>
           </p:cNvPr>
@@ -46474,7 +46767,7 @@
           <p:cNvPr id="2" name="Заголовок 1">
             <a:extLst>
               <a:ext uri="{FF2B5EF4-FFF2-40B4-BE49-F238E27FC236}">
-                <a16:creationId xmlns:a16="http://schemas.microsoft.com/office/drawing/2014/main" xmlns="" id="{F9A2C4CE-E016-E239-B40A-B2269830C351}"/>
+                <a16:creationId xmlns="" xmlns:a16="http://schemas.microsoft.com/office/drawing/2014/main" id="{F9A2C4CE-E016-E239-B40A-B2269830C351}"/>
               </a:ext>
             </a:extLst>
           </p:cNvPr>
@@ -46704,7 +46997,7 @@
           <p:cNvPr id="2" name="Заголовок 1">
             <a:extLst>
               <a:ext uri="{FF2B5EF4-FFF2-40B4-BE49-F238E27FC236}">
-                <a16:creationId xmlns:a16="http://schemas.microsoft.com/office/drawing/2014/main" xmlns="" id="{F9A2C4CE-E016-E239-B40A-B2269830C351}"/>
+                <a16:creationId xmlns="" xmlns:a16="http://schemas.microsoft.com/office/drawing/2014/main" id="{F9A2C4CE-E016-E239-B40A-B2269830C351}"/>
               </a:ext>
             </a:extLst>
           </p:cNvPr>
@@ -46934,7 +47227,7 @@
           <p:cNvPr id="2" name="Заголовок 1">
             <a:extLst>
               <a:ext uri="{FF2B5EF4-FFF2-40B4-BE49-F238E27FC236}">
-                <a16:creationId xmlns:a16="http://schemas.microsoft.com/office/drawing/2014/main" xmlns="" id="{F9A2C4CE-E016-E239-B40A-B2269830C351}"/>
+                <a16:creationId xmlns="" xmlns:a16="http://schemas.microsoft.com/office/drawing/2014/main" id="{F9A2C4CE-E016-E239-B40A-B2269830C351}"/>
               </a:ext>
             </a:extLst>
           </p:cNvPr>
@@ -47144,7 +47437,7 @@
           <p:cNvPr id="2" name="Заголовок 1">
             <a:extLst>
               <a:ext uri="{FF2B5EF4-FFF2-40B4-BE49-F238E27FC236}">
-                <a16:creationId xmlns:a16="http://schemas.microsoft.com/office/drawing/2014/main" xmlns="" id="{F9A2C4CE-E016-E239-B40A-B2269830C351}"/>
+                <a16:creationId xmlns="" xmlns:a16="http://schemas.microsoft.com/office/drawing/2014/main" id="{F9A2C4CE-E016-E239-B40A-B2269830C351}"/>
               </a:ext>
             </a:extLst>
           </p:cNvPr>
@@ -47310,7 +47603,7 @@
           <p:cNvPr id="2" name="Заголовок 1">
             <a:extLst>
               <a:ext uri="{FF2B5EF4-FFF2-40B4-BE49-F238E27FC236}">
-                <a16:creationId xmlns:a16="http://schemas.microsoft.com/office/drawing/2014/main" xmlns="" id="{F9A2C4CE-E016-E239-B40A-B2269830C351}"/>
+                <a16:creationId xmlns="" xmlns:a16="http://schemas.microsoft.com/office/drawing/2014/main" id="{F9A2C4CE-E016-E239-B40A-B2269830C351}"/>
               </a:ext>
             </a:extLst>
           </p:cNvPr>
@@ -47583,7 +47876,7 @@
           <p:cNvPr id="2" name="Заголовок 1">
             <a:extLst>
               <a:ext uri="{FF2B5EF4-FFF2-40B4-BE49-F238E27FC236}">
-                <a16:creationId xmlns:a16="http://schemas.microsoft.com/office/drawing/2014/main" xmlns="" id="{F9A2C4CE-E016-E239-B40A-B2269830C351}"/>
+                <a16:creationId xmlns="" xmlns:a16="http://schemas.microsoft.com/office/drawing/2014/main" id="{F9A2C4CE-E016-E239-B40A-B2269830C351}"/>
               </a:ext>
             </a:extLst>
           </p:cNvPr>
@@ -47892,7 +48185,7 @@
           <p:cNvPr id="2" name="Заголовок 1">
             <a:extLst>
               <a:ext uri="{FF2B5EF4-FFF2-40B4-BE49-F238E27FC236}">
-                <a16:creationId xmlns:a16="http://schemas.microsoft.com/office/drawing/2014/main" xmlns="" id="{F9A2C4CE-E016-E239-B40A-B2269830C351}"/>
+                <a16:creationId xmlns="" xmlns:a16="http://schemas.microsoft.com/office/drawing/2014/main" id="{F9A2C4CE-E016-E239-B40A-B2269830C351}"/>
               </a:ext>
             </a:extLst>
           </p:cNvPr>
@@ -48108,7 +48401,7 @@
           <p:cNvPr id="2" name="Заголовок 1">
             <a:extLst>
               <a:ext uri="{FF2B5EF4-FFF2-40B4-BE49-F238E27FC236}">
-                <a16:creationId xmlns:a16="http://schemas.microsoft.com/office/drawing/2014/main" xmlns="" id="{F9A2C4CE-E016-E239-B40A-B2269830C351}"/>
+                <a16:creationId xmlns="" xmlns:a16="http://schemas.microsoft.com/office/drawing/2014/main" id="{F9A2C4CE-E016-E239-B40A-B2269830C351}"/>
               </a:ext>
             </a:extLst>
           </p:cNvPr>
@@ -48493,7 +48786,7 @@
   <a:extraClrSchemeLst/>
   <a:extLst>
     <a:ext uri="{05A4C25C-085E-4340-85A3-A5531E510DB2}">
-      <thm15:themeFamily xmlns:thm15="http://schemas.microsoft.com/office/thememl/2012/main" xmlns="" name="Office 2013 - 2022 Theme" id="{62F939B6-93AF-4DB8-9C6B-D6C7DFDC589F}" vid="{3E4F19A7-A959-40BB-972C-4880BAF8EB09}"/>
+      <thm15:themeFamily xmlns="" xmlns:thm15="http://schemas.microsoft.com/office/thememl/2012/main" name="Office 2013 - 2022 Theme" id="{62F939B6-93AF-4DB8-9C6B-D6C7DFDC589F}" vid="{3E4F19A7-A959-40BB-972C-4880BAF8EB09}"/>
     </a:ext>
   </a:extLst>
 </a:theme>
@@ -48788,7 +49081,7 @@
   <a:extraClrSchemeLst/>
   <a:extLst>
     <a:ext uri="{05A4C25C-085E-4340-85A3-A5531E510DB2}">
-      <thm15:themeFamily xmlns:thm15="http://schemas.microsoft.com/office/thememl/2012/main" xmlns="" name="Office Theme" id="{62F939B6-93AF-4DB8-9C6B-D6C7DFDC589F}" vid="{4A3C46E8-61CC-4603-A589-7422A47A8E4A}"/>
+      <thm15:themeFamily xmlns="" xmlns:thm15="http://schemas.microsoft.com/office/thememl/2012/main" name="Office Theme" id="{62F939B6-93AF-4DB8-9C6B-D6C7DFDC589F}" vid="{4A3C46E8-61CC-4603-A589-7422A47A8E4A}"/>
     </a:ext>
   </a:extLst>
 </a:theme>

</xml_diff>

<commit_message>
Foundations Of Java For ABAP Programmers
</commit_message>
<xml_diff>
--- a/Установка_JDK_Настройка_IDE_Основы_ООП_JAVA.pptx
+++ b/Установка_JDK_Настройка_IDE_Основы_ООП_JAVA.pptx
@@ -158,7 +158,7 @@
   </p:defaultTextStyle>
   <p:extLst>
     <p:ext uri="{EFAFB233-063F-42B5-8137-9DF3F51BA10A}">
-      <p15:sldGuideLst xmlns="" xmlns:p15="http://schemas.microsoft.com/office/powerpoint/2012/main">
+      <p15:sldGuideLst xmlns:p15="http://schemas.microsoft.com/office/powerpoint/2012/main" xmlns="">
         <p15:guide id="1" orient="horz" pos="2160">
           <p15:clr>
             <a:srgbClr val="A4A3A4"/>
@@ -300,7 +300,7 @@
           <a:p>
             <a:fld id="{547B99C5-9E73-4D85-8495-5EC431CC6481}" type="datetimeFigureOut">
               <a:rPr lang="ru-RU" smtClean="0"/>
-              <a:t>04.02.2025</a:t>
+              <a:t>05.02.2025</a:t>
             </a:fld>
             <a:endParaRPr lang="ru-RU"/>
           </a:p>
@@ -18059,6 +18059,766 @@
               <a:tabLst/>
               <a:defRPr/>
             </a:pPr>
+            <a:r>
+              <a:rPr lang="ru-RU" sz="1200" b="0" i="0" kern="1200" smtClean="0">
+                <a:solidFill>
+                  <a:schemeClr val="tx1"/>
+                </a:solidFill>
+                <a:effectLst/>
+                <a:latin typeface="+mn-lt"/>
+                <a:ea typeface="+mn-ea"/>
+                <a:cs typeface="+mn-cs"/>
+              </a:rPr>
+              <a:t>Переменные окружения — это динамические значения, которые могут влиять на поведение процессов в операционной системе. Они хранят информацию, которая может быть использована программами и скриптами. Вот несколько основных причин, для чего нужны переменные окружения:</a:t>
+            </a:r>
+          </a:p>
+          <a:p>
+            <a:pPr marL="0" marR="0" lvl="2" indent="0" algn="l" defTabSz="914400" rtl="0" eaLnBrk="1" fontAlgn="auto" latinLnBrk="0" hangingPunct="1">
+              <a:lnSpc>
+                <a:spcPct val="100000"/>
+              </a:lnSpc>
+              <a:spcBef>
+                <a:spcPts val="0"/>
+              </a:spcBef>
+              <a:spcAft>
+                <a:spcPts val="0"/>
+              </a:spcAft>
+              <a:buClrTx/>
+              <a:buSzTx/>
+              <a:buFontTx/>
+              <a:buNone/>
+              <a:tabLst/>
+              <a:defRPr/>
+            </a:pPr>
+            <a:endParaRPr lang="ru-RU" sz="1200" b="0" i="0" kern="1200" smtClean="0">
+              <a:solidFill>
+                <a:schemeClr val="tx1"/>
+              </a:solidFill>
+              <a:effectLst/>
+              <a:latin typeface="+mn-lt"/>
+              <a:ea typeface="+mn-ea"/>
+              <a:cs typeface="+mn-cs"/>
+            </a:endParaRPr>
+          </a:p>
+          <a:p>
+            <a:pPr marL="0" marR="0" lvl="2" indent="0" algn="l" defTabSz="914400" rtl="0" eaLnBrk="1" fontAlgn="auto" latinLnBrk="0" hangingPunct="1">
+              <a:lnSpc>
+                <a:spcPct val="100000"/>
+              </a:lnSpc>
+              <a:spcBef>
+                <a:spcPts val="0"/>
+              </a:spcBef>
+              <a:spcAft>
+                <a:spcPts val="0"/>
+              </a:spcAft>
+              <a:buClrTx/>
+              <a:buSzTx/>
+              <a:buFontTx/>
+              <a:buNone/>
+              <a:tabLst/>
+              <a:defRPr/>
+            </a:pPr>
+            <a:r>
+              <a:rPr lang="ru-RU" sz="1200" b="0" i="0" kern="1200" smtClean="0">
+                <a:solidFill>
+                  <a:schemeClr val="tx1"/>
+                </a:solidFill>
+                <a:effectLst/>
+                <a:latin typeface="+mn-lt"/>
+                <a:ea typeface="+mn-ea"/>
+                <a:cs typeface="+mn-cs"/>
+              </a:rPr>
+              <a:t>### 1. **Настройка среды выполнения**</a:t>
+            </a:r>
+          </a:p>
+          <a:p>
+            <a:pPr marL="0" marR="0" lvl="2" indent="0" algn="l" defTabSz="914400" rtl="0" eaLnBrk="1" fontAlgn="auto" latinLnBrk="0" hangingPunct="1">
+              <a:lnSpc>
+                <a:spcPct val="100000"/>
+              </a:lnSpc>
+              <a:spcBef>
+                <a:spcPts val="0"/>
+              </a:spcBef>
+              <a:spcAft>
+                <a:spcPts val="0"/>
+              </a:spcAft>
+              <a:buClrTx/>
+              <a:buSzTx/>
+              <a:buFontTx/>
+              <a:buNone/>
+              <a:tabLst/>
+              <a:defRPr/>
+            </a:pPr>
+            <a:r>
+              <a:rPr lang="ru-RU" sz="1200" b="0" i="0" kern="1200" smtClean="0">
+                <a:solidFill>
+                  <a:schemeClr val="tx1"/>
+                </a:solidFill>
+                <a:effectLst/>
+                <a:latin typeface="+mn-lt"/>
+                <a:ea typeface="+mn-ea"/>
+                <a:cs typeface="+mn-cs"/>
+              </a:rPr>
+              <a:t>Переменные окружения позволяют настроить поведение программ в зависимости от окружения. Например, переменная `JAVA_HOME` указывает путь к установленной Java, что позволяет различным Java-программам находить нужные библиотеки и инструменты.</a:t>
+            </a:r>
+          </a:p>
+          <a:p>
+            <a:pPr marL="0" marR="0" lvl="2" indent="0" algn="l" defTabSz="914400" rtl="0" eaLnBrk="1" fontAlgn="auto" latinLnBrk="0" hangingPunct="1">
+              <a:lnSpc>
+                <a:spcPct val="100000"/>
+              </a:lnSpc>
+              <a:spcBef>
+                <a:spcPts val="0"/>
+              </a:spcBef>
+              <a:spcAft>
+                <a:spcPts val="0"/>
+              </a:spcAft>
+              <a:buClrTx/>
+              <a:buSzTx/>
+              <a:buFontTx/>
+              <a:buNone/>
+              <a:tabLst/>
+              <a:defRPr/>
+            </a:pPr>
+            <a:endParaRPr lang="ru-RU" sz="1200" b="0" i="0" kern="1200" smtClean="0">
+              <a:solidFill>
+                <a:schemeClr val="tx1"/>
+              </a:solidFill>
+              <a:effectLst/>
+              <a:latin typeface="+mn-lt"/>
+              <a:ea typeface="+mn-ea"/>
+              <a:cs typeface="+mn-cs"/>
+            </a:endParaRPr>
+          </a:p>
+          <a:p>
+            <a:pPr marL="0" marR="0" lvl="2" indent="0" algn="l" defTabSz="914400" rtl="0" eaLnBrk="1" fontAlgn="auto" latinLnBrk="0" hangingPunct="1">
+              <a:lnSpc>
+                <a:spcPct val="100000"/>
+              </a:lnSpc>
+              <a:spcBef>
+                <a:spcPts val="0"/>
+              </a:spcBef>
+              <a:spcAft>
+                <a:spcPts val="0"/>
+              </a:spcAft>
+              <a:buClrTx/>
+              <a:buSzTx/>
+              <a:buFontTx/>
+              <a:buNone/>
+              <a:tabLst/>
+              <a:defRPr/>
+            </a:pPr>
+            <a:r>
+              <a:rPr lang="ru-RU" sz="1200" b="0" i="0" kern="1200" smtClean="0">
+                <a:solidFill>
+                  <a:schemeClr val="tx1"/>
+                </a:solidFill>
+                <a:effectLst/>
+                <a:latin typeface="+mn-lt"/>
+                <a:ea typeface="+mn-ea"/>
+                <a:cs typeface="+mn-cs"/>
+              </a:rPr>
+              <a:t>### 2. **Хранение конфиденциальной информации**</a:t>
+            </a:r>
+          </a:p>
+          <a:p>
+            <a:pPr marL="0" marR="0" lvl="2" indent="0" algn="l" defTabSz="914400" rtl="0" eaLnBrk="1" fontAlgn="auto" latinLnBrk="0" hangingPunct="1">
+              <a:lnSpc>
+                <a:spcPct val="100000"/>
+              </a:lnSpc>
+              <a:spcBef>
+                <a:spcPts val="0"/>
+              </a:spcBef>
+              <a:spcAft>
+                <a:spcPts val="0"/>
+              </a:spcAft>
+              <a:buClrTx/>
+              <a:buSzTx/>
+              <a:buFontTx/>
+              <a:buNone/>
+              <a:tabLst/>
+              <a:defRPr/>
+            </a:pPr>
+            <a:r>
+              <a:rPr lang="ru-RU" sz="1200" b="0" i="0" kern="1200" smtClean="0">
+                <a:solidFill>
+                  <a:schemeClr val="tx1"/>
+                </a:solidFill>
+                <a:effectLst/>
+                <a:latin typeface="+mn-lt"/>
+                <a:ea typeface="+mn-ea"/>
+                <a:cs typeface="+mn-cs"/>
+              </a:rPr>
+              <a:t>Переменные окружения часто используются для хранения конфиденциальных данных, таких как пароли и ключи API. Это позволяет избежать жесткого кодирования этих данных в исходном коде, что повышает безопасность приложения.</a:t>
+            </a:r>
+          </a:p>
+          <a:p>
+            <a:pPr marL="0" marR="0" lvl="2" indent="0" algn="l" defTabSz="914400" rtl="0" eaLnBrk="1" fontAlgn="auto" latinLnBrk="0" hangingPunct="1">
+              <a:lnSpc>
+                <a:spcPct val="100000"/>
+              </a:lnSpc>
+              <a:spcBef>
+                <a:spcPts val="0"/>
+              </a:spcBef>
+              <a:spcAft>
+                <a:spcPts val="0"/>
+              </a:spcAft>
+              <a:buClrTx/>
+              <a:buSzTx/>
+              <a:buFontTx/>
+              <a:buNone/>
+              <a:tabLst/>
+              <a:defRPr/>
+            </a:pPr>
+            <a:endParaRPr lang="ru-RU" sz="1200" b="0" i="0" kern="1200" smtClean="0">
+              <a:solidFill>
+                <a:schemeClr val="tx1"/>
+              </a:solidFill>
+              <a:effectLst/>
+              <a:latin typeface="+mn-lt"/>
+              <a:ea typeface="+mn-ea"/>
+              <a:cs typeface="+mn-cs"/>
+            </a:endParaRPr>
+          </a:p>
+          <a:p>
+            <a:pPr marL="0" marR="0" lvl="2" indent="0" algn="l" defTabSz="914400" rtl="0" eaLnBrk="1" fontAlgn="auto" latinLnBrk="0" hangingPunct="1">
+              <a:lnSpc>
+                <a:spcPct val="100000"/>
+              </a:lnSpc>
+              <a:spcBef>
+                <a:spcPts val="0"/>
+              </a:spcBef>
+              <a:spcAft>
+                <a:spcPts val="0"/>
+              </a:spcAft>
+              <a:buClrTx/>
+              <a:buSzTx/>
+              <a:buFontTx/>
+              <a:buNone/>
+              <a:tabLst/>
+              <a:defRPr/>
+            </a:pPr>
+            <a:r>
+              <a:rPr lang="ru-RU" sz="1200" b="0" i="0" kern="1200" smtClean="0">
+                <a:solidFill>
+                  <a:schemeClr val="tx1"/>
+                </a:solidFill>
+                <a:effectLst/>
+                <a:latin typeface="+mn-lt"/>
+                <a:ea typeface="+mn-ea"/>
+                <a:cs typeface="+mn-cs"/>
+              </a:rPr>
+              <a:t>### 3. **Управление конфигурацией**</a:t>
+            </a:r>
+          </a:p>
+          <a:p>
+            <a:pPr marL="0" marR="0" lvl="2" indent="0" algn="l" defTabSz="914400" rtl="0" eaLnBrk="1" fontAlgn="auto" latinLnBrk="0" hangingPunct="1">
+              <a:lnSpc>
+                <a:spcPct val="100000"/>
+              </a:lnSpc>
+              <a:spcBef>
+                <a:spcPts val="0"/>
+              </a:spcBef>
+              <a:spcAft>
+                <a:spcPts val="0"/>
+              </a:spcAft>
+              <a:buClrTx/>
+              <a:buSzTx/>
+              <a:buFontTx/>
+              <a:buNone/>
+              <a:tabLst/>
+              <a:defRPr/>
+            </a:pPr>
+            <a:r>
+              <a:rPr lang="ru-RU" sz="1200" b="0" i="0" kern="1200" smtClean="0">
+                <a:solidFill>
+                  <a:schemeClr val="tx1"/>
+                </a:solidFill>
+                <a:effectLst/>
+                <a:latin typeface="+mn-lt"/>
+                <a:ea typeface="+mn-ea"/>
+                <a:cs typeface="+mn-cs"/>
+              </a:rPr>
+              <a:t>Разные среды (разработка, тестирование, продакшн) могут требовать различных настроек. С помощью переменных окружения можно легко переключаться между конфигурациями без изменения кода.</a:t>
+            </a:r>
+          </a:p>
+          <a:p>
+            <a:pPr marL="0" marR="0" lvl="2" indent="0" algn="l" defTabSz="914400" rtl="0" eaLnBrk="1" fontAlgn="auto" latinLnBrk="0" hangingPunct="1">
+              <a:lnSpc>
+                <a:spcPct val="100000"/>
+              </a:lnSpc>
+              <a:spcBef>
+                <a:spcPts val="0"/>
+              </a:spcBef>
+              <a:spcAft>
+                <a:spcPts val="0"/>
+              </a:spcAft>
+              <a:buClrTx/>
+              <a:buSzTx/>
+              <a:buFontTx/>
+              <a:buNone/>
+              <a:tabLst/>
+              <a:defRPr/>
+            </a:pPr>
+            <a:endParaRPr lang="ru-RU" sz="1200" b="0" i="0" kern="1200" smtClean="0">
+              <a:solidFill>
+                <a:schemeClr val="tx1"/>
+              </a:solidFill>
+              <a:effectLst/>
+              <a:latin typeface="+mn-lt"/>
+              <a:ea typeface="+mn-ea"/>
+              <a:cs typeface="+mn-cs"/>
+            </a:endParaRPr>
+          </a:p>
+          <a:p>
+            <a:pPr marL="0" marR="0" lvl="2" indent="0" algn="l" defTabSz="914400" rtl="0" eaLnBrk="1" fontAlgn="auto" latinLnBrk="0" hangingPunct="1">
+              <a:lnSpc>
+                <a:spcPct val="100000"/>
+              </a:lnSpc>
+              <a:spcBef>
+                <a:spcPts val="0"/>
+              </a:spcBef>
+              <a:spcAft>
+                <a:spcPts val="0"/>
+              </a:spcAft>
+              <a:buClrTx/>
+              <a:buSzTx/>
+              <a:buFontTx/>
+              <a:buNone/>
+              <a:tabLst/>
+              <a:defRPr/>
+            </a:pPr>
+            <a:r>
+              <a:rPr lang="ru-RU" sz="1200" b="0" i="0" kern="1200" smtClean="0">
+                <a:solidFill>
+                  <a:schemeClr val="tx1"/>
+                </a:solidFill>
+                <a:effectLst/>
+                <a:latin typeface="+mn-lt"/>
+                <a:ea typeface="+mn-ea"/>
+                <a:cs typeface="+mn-cs"/>
+              </a:rPr>
+              <a:t>### 4. **Указание путей к ресурсам**</a:t>
+            </a:r>
+          </a:p>
+          <a:p>
+            <a:pPr marL="0" marR="0" lvl="2" indent="0" algn="l" defTabSz="914400" rtl="0" eaLnBrk="1" fontAlgn="auto" latinLnBrk="0" hangingPunct="1">
+              <a:lnSpc>
+                <a:spcPct val="100000"/>
+              </a:lnSpc>
+              <a:spcBef>
+                <a:spcPts val="0"/>
+              </a:spcBef>
+              <a:spcAft>
+                <a:spcPts val="0"/>
+              </a:spcAft>
+              <a:buClrTx/>
+              <a:buSzTx/>
+              <a:buFontTx/>
+              <a:buNone/>
+              <a:tabLst/>
+              <a:defRPr/>
+            </a:pPr>
+            <a:r>
+              <a:rPr lang="ru-RU" sz="1200" b="0" i="0" kern="1200" smtClean="0">
+                <a:solidFill>
+                  <a:schemeClr val="tx1"/>
+                </a:solidFill>
+                <a:effectLst/>
+                <a:latin typeface="+mn-lt"/>
+                <a:ea typeface="+mn-ea"/>
+                <a:cs typeface="+mn-cs"/>
+              </a:rPr>
+              <a:t>Переменные окружения могут указывать пути к файлам и директориям, которые необходимы программам. Например, переменная `PATH` содержит список директорий, в которых операционная система ищет исполняемые файлы.</a:t>
+            </a:r>
+          </a:p>
+          <a:p>
+            <a:pPr marL="0" marR="0" lvl="2" indent="0" algn="l" defTabSz="914400" rtl="0" eaLnBrk="1" fontAlgn="auto" latinLnBrk="0" hangingPunct="1">
+              <a:lnSpc>
+                <a:spcPct val="100000"/>
+              </a:lnSpc>
+              <a:spcBef>
+                <a:spcPts val="0"/>
+              </a:spcBef>
+              <a:spcAft>
+                <a:spcPts val="0"/>
+              </a:spcAft>
+              <a:buClrTx/>
+              <a:buSzTx/>
+              <a:buFontTx/>
+              <a:buNone/>
+              <a:tabLst/>
+              <a:defRPr/>
+            </a:pPr>
+            <a:endParaRPr lang="ru-RU" sz="1200" b="0" i="0" kern="1200" smtClean="0">
+              <a:solidFill>
+                <a:schemeClr val="tx1"/>
+              </a:solidFill>
+              <a:effectLst/>
+              <a:latin typeface="+mn-lt"/>
+              <a:ea typeface="+mn-ea"/>
+              <a:cs typeface="+mn-cs"/>
+            </a:endParaRPr>
+          </a:p>
+          <a:p>
+            <a:pPr marL="0" marR="0" lvl="2" indent="0" algn="l" defTabSz="914400" rtl="0" eaLnBrk="1" fontAlgn="auto" latinLnBrk="0" hangingPunct="1">
+              <a:lnSpc>
+                <a:spcPct val="100000"/>
+              </a:lnSpc>
+              <a:spcBef>
+                <a:spcPts val="0"/>
+              </a:spcBef>
+              <a:spcAft>
+                <a:spcPts val="0"/>
+              </a:spcAft>
+              <a:buClrTx/>
+              <a:buSzTx/>
+              <a:buFontTx/>
+              <a:buNone/>
+              <a:tabLst/>
+              <a:defRPr/>
+            </a:pPr>
+            <a:r>
+              <a:rPr lang="ru-RU" sz="1200" b="0" i="0" kern="1200" smtClean="0">
+                <a:solidFill>
+                  <a:schemeClr val="tx1"/>
+                </a:solidFill>
+                <a:effectLst/>
+                <a:latin typeface="+mn-lt"/>
+                <a:ea typeface="+mn-ea"/>
+                <a:cs typeface="+mn-cs"/>
+              </a:rPr>
+              <a:t>### 5. **Упрощение работы с системными командами**</a:t>
+            </a:r>
+          </a:p>
+          <a:p>
+            <a:pPr marL="0" marR="0" lvl="2" indent="0" algn="l" defTabSz="914400" rtl="0" eaLnBrk="1" fontAlgn="auto" latinLnBrk="0" hangingPunct="1">
+              <a:lnSpc>
+                <a:spcPct val="100000"/>
+              </a:lnSpc>
+              <a:spcBef>
+                <a:spcPts val="0"/>
+              </a:spcBef>
+              <a:spcAft>
+                <a:spcPts val="0"/>
+              </a:spcAft>
+              <a:buClrTx/>
+              <a:buSzTx/>
+              <a:buFontTx/>
+              <a:buNone/>
+              <a:tabLst/>
+              <a:defRPr/>
+            </a:pPr>
+            <a:r>
+              <a:rPr lang="ru-RU" sz="1200" b="0" i="0" kern="1200" smtClean="0">
+                <a:solidFill>
+                  <a:schemeClr val="tx1"/>
+                </a:solidFill>
+                <a:effectLst/>
+                <a:latin typeface="+mn-lt"/>
+                <a:ea typeface="+mn-ea"/>
+                <a:cs typeface="+mn-cs"/>
+              </a:rPr>
+              <a:t>Некоторые команды и утилиты могут использовать переменные окружения для получения информации о текущем пользователе, домашнем каталоге и других системных параметрах. Это упрощает написание скриптов и автоматизацию задач.</a:t>
+            </a:r>
+          </a:p>
+          <a:p>
+            <a:pPr marL="0" marR="0" lvl="2" indent="0" algn="l" defTabSz="914400" rtl="0" eaLnBrk="1" fontAlgn="auto" latinLnBrk="0" hangingPunct="1">
+              <a:lnSpc>
+                <a:spcPct val="100000"/>
+              </a:lnSpc>
+              <a:spcBef>
+                <a:spcPts val="0"/>
+              </a:spcBef>
+              <a:spcAft>
+                <a:spcPts val="0"/>
+              </a:spcAft>
+              <a:buClrTx/>
+              <a:buSzTx/>
+              <a:buFontTx/>
+              <a:buNone/>
+              <a:tabLst/>
+              <a:defRPr/>
+            </a:pPr>
+            <a:endParaRPr lang="ru-RU" sz="1200" b="0" i="0" kern="1200" smtClean="0">
+              <a:solidFill>
+                <a:schemeClr val="tx1"/>
+              </a:solidFill>
+              <a:effectLst/>
+              <a:latin typeface="+mn-lt"/>
+              <a:ea typeface="+mn-ea"/>
+              <a:cs typeface="+mn-cs"/>
+            </a:endParaRPr>
+          </a:p>
+          <a:p>
+            <a:pPr marL="0" marR="0" lvl="2" indent="0" algn="l" defTabSz="914400" rtl="0" eaLnBrk="1" fontAlgn="auto" latinLnBrk="0" hangingPunct="1">
+              <a:lnSpc>
+                <a:spcPct val="100000"/>
+              </a:lnSpc>
+              <a:spcBef>
+                <a:spcPts val="0"/>
+              </a:spcBef>
+              <a:spcAft>
+                <a:spcPts val="0"/>
+              </a:spcAft>
+              <a:buClrTx/>
+              <a:buSzTx/>
+              <a:buFontTx/>
+              <a:buNone/>
+              <a:tabLst/>
+              <a:defRPr/>
+            </a:pPr>
+            <a:r>
+              <a:rPr lang="ru-RU" sz="1200" b="0" i="0" kern="1200" smtClean="0">
+                <a:solidFill>
+                  <a:schemeClr val="tx1"/>
+                </a:solidFill>
+                <a:effectLst/>
+                <a:latin typeface="+mn-lt"/>
+                <a:ea typeface="+mn-ea"/>
+                <a:cs typeface="+mn-cs"/>
+              </a:rPr>
+              <a:t>### Примеры использования переменных окружения</a:t>
+            </a:r>
+          </a:p>
+          <a:p>
+            <a:pPr marL="0" marR="0" lvl="2" indent="0" algn="l" defTabSz="914400" rtl="0" eaLnBrk="1" fontAlgn="auto" latinLnBrk="0" hangingPunct="1">
+              <a:lnSpc>
+                <a:spcPct val="100000"/>
+              </a:lnSpc>
+              <a:spcBef>
+                <a:spcPts val="0"/>
+              </a:spcBef>
+              <a:spcAft>
+                <a:spcPts val="0"/>
+              </a:spcAft>
+              <a:buClrTx/>
+              <a:buSzTx/>
+              <a:buFontTx/>
+              <a:buNone/>
+              <a:tabLst/>
+              <a:defRPr/>
+            </a:pPr>
+            <a:endParaRPr lang="ru-RU" sz="1200" b="0" i="0" kern="1200" smtClean="0">
+              <a:solidFill>
+                <a:schemeClr val="tx1"/>
+              </a:solidFill>
+              <a:effectLst/>
+              <a:latin typeface="+mn-lt"/>
+              <a:ea typeface="+mn-ea"/>
+              <a:cs typeface="+mn-cs"/>
+            </a:endParaRPr>
+          </a:p>
+          <a:p>
+            <a:pPr marL="0" marR="0" lvl="2" indent="0" algn="l" defTabSz="914400" rtl="0" eaLnBrk="1" fontAlgn="auto" latinLnBrk="0" hangingPunct="1">
+              <a:lnSpc>
+                <a:spcPct val="100000"/>
+              </a:lnSpc>
+              <a:spcBef>
+                <a:spcPts val="0"/>
+              </a:spcBef>
+              <a:spcAft>
+                <a:spcPts val="0"/>
+              </a:spcAft>
+              <a:buClrTx/>
+              <a:buSzTx/>
+              <a:buFontTx/>
+              <a:buNone/>
+              <a:tabLst/>
+              <a:defRPr/>
+            </a:pPr>
+            <a:r>
+              <a:rPr lang="ru-RU" sz="1200" b="0" i="0" kern="1200" smtClean="0">
+                <a:solidFill>
+                  <a:schemeClr val="tx1"/>
+                </a:solidFill>
+                <a:effectLst/>
+                <a:latin typeface="+mn-lt"/>
+                <a:ea typeface="+mn-ea"/>
+                <a:cs typeface="+mn-cs"/>
+              </a:rPr>
+              <a:t>- **`PATH`**: указывает, где искать исполняемые файлы.</a:t>
+            </a:r>
+          </a:p>
+          <a:p>
+            <a:pPr marL="0" marR="0" lvl="2" indent="0" algn="l" defTabSz="914400" rtl="0" eaLnBrk="1" fontAlgn="auto" latinLnBrk="0" hangingPunct="1">
+              <a:lnSpc>
+                <a:spcPct val="100000"/>
+              </a:lnSpc>
+              <a:spcBef>
+                <a:spcPts val="0"/>
+              </a:spcBef>
+              <a:spcAft>
+                <a:spcPts val="0"/>
+              </a:spcAft>
+              <a:buClrTx/>
+              <a:buSzTx/>
+              <a:buFontTx/>
+              <a:buNone/>
+              <a:tabLst/>
+              <a:defRPr/>
+            </a:pPr>
+            <a:r>
+              <a:rPr lang="ru-RU" sz="1200" b="0" i="0" kern="1200" smtClean="0">
+                <a:solidFill>
+                  <a:schemeClr val="tx1"/>
+                </a:solidFill>
+                <a:effectLst/>
+                <a:latin typeface="+mn-lt"/>
+                <a:ea typeface="+mn-ea"/>
+                <a:cs typeface="+mn-cs"/>
+              </a:rPr>
+              <a:t>- **`HOME`**: содержит путь к домашнему каталогу пользователя.</a:t>
+            </a:r>
+          </a:p>
+          <a:p>
+            <a:pPr marL="0" marR="0" lvl="2" indent="0" algn="l" defTabSz="914400" rtl="0" eaLnBrk="1" fontAlgn="auto" latinLnBrk="0" hangingPunct="1">
+              <a:lnSpc>
+                <a:spcPct val="100000"/>
+              </a:lnSpc>
+              <a:spcBef>
+                <a:spcPts val="0"/>
+              </a:spcBef>
+              <a:spcAft>
+                <a:spcPts val="0"/>
+              </a:spcAft>
+              <a:buClrTx/>
+              <a:buSzTx/>
+              <a:buFontTx/>
+              <a:buNone/>
+              <a:tabLst/>
+              <a:defRPr/>
+            </a:pPr>
+            <a:r>
+              <a:rPr lang="ru-RU" sz="1200" b="0" i="0" kern="1200" smtClean="0">
+                <a:solidFill>
+                  <a:schemeClr val="tx1"/>
+                </a:solidFill>
+                <a:effectLst/>
+                <a:latin typeface="+mn-lt"/>
+                <a:ea typeface="+mn-ea"/>
+                <a:cs typeface="+mn-cs"/>
+              </a:rPr>
+              <a:t>- **`TEMP`**: указывает директорию для временных файлов.</a:t>
+            </a:r>
+          </a:p>
+          <a:p>
+            <a:pPr marL="0" marR="0" lvl="2" indent="0" algn="l" defTabSz="914400" rtl="0" eaLnBrk="1" fontAlgn="auto" latinLnBrk="0" hangingPunct="1">
+              <a:lnSpc>
+                <a:spcPct val="100000"/>
+              </a:lnSpc>
+              <a:spcBef>
+                <a:spcPts val="0"/>
+              </a:spcBef>
+              <a:spcAft>
+                <a:spcPts val="0"/>
+              </a:spcAft>
+              <a:buClrTx/>
+              <a:buSzTx/>
+              <a:buFontTx/>
+              <a:buNone/>
+              <a:tabLst/>
+              <a:defRPr/>
+            </a:pPr>
+            <a:endParaRPr lang="ru-RU" sz="1200" b="0" i="0" kern="1200" smtClean="0">
+              <a:solidFill>
+                <a:schemeClr val="tx1"/>
+              </a:solidFill>
+              <a:effectLst/>
+              <a:latin typeface="+mn-lt"/>
+              <a:ea typeface="+mn-ea"/>
+              <a:cs typeface="+mn-cs"/>
+            </a:endParaRPr>
+          </a:p>
+          <a:p>
+            <a:pPr marL="0" marR="0" lvl="2" indent="0" algn="l" defTabSz="914400" rtl="0" eaLnBrk="1" fontAlgn="auto" latinLnBrk="0" hangingPunct="1">
+              <a:lnSpc>
+                <a:spcPct val="100000"/>
+              </a:lnSpc>
+              <a:spcBef>
+                <a:spcPts val="0"/>
+              </a:spcBef>
+              <a:spcAft>
+                <a:spcPts val="0"/>
+              </a:spcAft>
+              <a:buClrTx/>
+              <a:buSzTx/>
+              <a:buFontTx/>
+              <a:buNone/>
+              <a:tabLst/>
+              <a:defRPr/>
+            </a:pPr>
+            <a:r>
+              <a:rPr lang="ru-RU" sz="1200" b="0" i="0" kern="1200" smtClean="0">
+                <a:solidFill>
+                  <a:schemeClr val="tx1"/>
+                </a:solidFill>
+                <a:effectLst/>
+                <a:latin typeface="+mn-lt"/>
+                <a:ea typeface="+mn-ea"/>
+                <a:cs typeface="+mn-cs"/>
+              </a:rPr>
+              <a:t>### Заключение</a:t>
+            </a:r>
+          </a:p>
+          <a:p>
+            <a:pPr marL="0" marR="0" lvl="2" indent="0" algn="l" defTabSz="914400" rtl="0" eaLnBrk="1" fontAlgn="auto" latinLnBrk="0" hangingPunct="1">
+              <a:lnSpc>
+                <a:spcPct val="100000"/>
+              </a:lnSpc>
+              <a:spcBef>
+                <a:spcPts val="0"/>
+              </a:spcBef>
+              <a:spcAft>
+                <a:spcPts val="0"/>
+              </a:spcAft>
+              <a:buClrTx/>
+              <a:buSzTx/>
+              <a:buFontTx/>
+              <a:buNone/>
+              <a:tabLst/>
+              <a:defRPr/>
+            </a:pPr>
+            <a:endParaRPr lang="ru-RU" sz="1200" b="0" i="0" kern="1200" smtClean="0">
+              <a:solidFill>
+                <a:schemeClr val="tx1"/>
+              </a:solidFill>
+              <a:effectLst/>
+              <a:latin typeface="+mn-lt"/>
+              <a:ea typeface="+mn-ea"/>
+              <a:cs typeface="+mn-cs"/>
+            </a:endParaRPr>
+          </a:p>
+          <a:p>
+            <a:pPr marL="0" marR="0" lvl="2" indent="0" algn="l" defTabSz="914400" rtl="0" eaLnBrk="1" fontAlgn="auto" latinLnBrk="0" hangingPunct="1">
+              <a:lnSpc>
+                <a:spcPct val="100000"/>
+              </a:lnSpc>
+              <a:spcBef>
+                <a:spcPts val="0"/>
+              </a:spcBef>
+              <a:spcAft>
+                <a:spcPts val="0"/>
+              </a:spcAft>
+              <a:buClrTx/>
+              <a:buSzTx/>
+              <a:buFontTx/>
+              <a:buNone/>
+              <a:tabLst/>
+              <a:defRPr/>
+            </a:pPr>
+            <a:r>
+              <a:rPr lang="ru-RU" sz="1200" b="0" i="0" kern="1200" smtClean="0">
+                <a:solidFill>
+                  <a:schemeClr val="tx1"/>
+                </a:solidFill>
+                <a:effectLst/>
+                <a:latin typeface="+mn-lt"/>
+                <a:ea typeface="+mn-ea"/>
+                <a:cs typeface="+mn-cs"/>
+              </a:rPr>
+              <a:t>Переменные окружения являются важным инструментом для настройки и управления поведением программ и систем. Они обеспечивают гибкость, безопасность и удобство при разработке и развертывании приложений. Если у вас есть дополнительные вопросы о переменных окружения или их использовании, не стесняйтесь спрашивать! 😊</a:t>
+            </a:r>
             <a:endParaRPr lang="ru-RU" sz="1200" b="0" i="0" kern="1200" dirty="0">
               <a:solidFill>
                 <a:schemeClr val="tx1"/>
@@ -27779,7 +28539,7 @@
           <a:p>
             <a:fld id="{6D05CBBA-D782-497D-B3B5-452762B3B9E7}" type="datetimeFigureOut">
               <a:rPr lang="ru-RU" smtClean="0"/>
-              <a:t>04.02.2025</a:t>
+              <a:t>05.02.2025</a:t>
             </a:fld>
             <a:endParaRPr lang="ru-RU"/>
           </a:p>
@@ -27949,7 +28709,7 @@
           <a:p>
             <a:fld id="{6D05CBBA-D782-497D-B3B5-452762B3B9E7}" type="datetimeFigureOut">
               <a:rPr lang="ru-RU" smtClean="0"/>
-              <a:t>04.02.2025</a:t>
+              <a:t>05.02.2025</a:t>
             </a:fld>
             <a:endParaRPr lang="ru-RU"/>
           </a:p>
@@ -28129,7 +28889,7 @@
           <a:p>
             <a:fld id="{6D05CBBA-D782-497D-B3B5-452762B3B9E7}" type="datetimeFigureOut">
               <a:rPr lang="ru-RU" smtClean="0"/>
-              <a:t>04.02.2025</a:t>
+              <a:t>05.02.2025</a:t>
             </a:fld>
             <a:endParaRPr lang="ru-RU"/>
           </a:p>
@@ -28345,7 +29105,7 @@
           <a:p>
             <a:fld id="{6D05CBBA-D782-497D-B3B5-452762B3B9E7}" type="datetimeFigureOut">
               <a:rPr lang="ru-RU" smtClean="0"/>
-              <a:t>04.02.2025</a:t>
+              <a:t>05.02.2025</a:t>
             </a:fld>
             <a:endParaRPr lang="ru-RU"/>
           </a:p>
@@ -28405,7 +29165,7 @@
   </p:clrMapOvr>
   <p:extLst>
     <p:ext uri="{DCECCB84-F9BA-43D5-87BE-67443E8EF086}">
-      <p15:sldGuideLst xmlns="" xmlns:p15="http://schemas.microsoft.com/office/powerpoint/2012/main">
+      <p15:sldGuideLst xmlns:p15="http://schemas.microsoft.com/office/powerpoint/2012/main" xmlns="">
         <p15:guide id="1" orient="horz" pos="414" userDrawn="1">
           <p15:clr>
             <a:srgbClr val="FBAE40"/>
@@ -28612,7 +29372,7 @@
           <a:p>
             <a:fld id="{6D05CBBA-D782-497D-B3B5-452762B3B9E7}" type="datetimeFigureOut">
               <a:rPr lang="ru-RU" smtClean="0"/>
-              <a:t>04.02.2025</a:t>
+              <a:t>05.02.2025</a:t>
             </a:fld>
             <a:endParaRPr lang="ru-RU"/>
           </a:p>
@@ -28844,7 +29604,7 @@
           <a:p>
             <a:fld id="{6D05CBBA-D782-497D-B3B5-452762B3B9E7}" type="datetimeFigureOut">
               <a:rPr lang="ru-RU" smtClean="0"/>
-              <a:t>04.02.2025</a:t>
+              <a:t>05.02.2025</a:t>
             </a:fld>
             <a:endParaRPr lang="ru-RU"/>
           </a:p>
@@ -29211,7 +29971,7 @@
           <a:p>
             <a:fld id="{6D05CBBA-D782-497D-B3B5-452762B3B9E7}" type="datetimeFigureOut">
               <a:rPr lang="ru-RU" smtClean="0"/>
-              <a:t>04.02.2025</a:t>
+              <a:t>05.02.2025</a:t>
             </a:fld>
             <a:endParaRPr lang="ru-RU"/>
           </a:p>
@@ -29329,7 +30089,7 @@
           <a:p>
             <a:fld id="{6D05CBBA-D782-497D-B3B5-452762B3B9E7}" type="datetimeFigureOut">
               <a:rPr lang="ru-RU" smtClean="0"/>
-              <a:t>04.02.2025</a:t>
+              <a:t>05.02.2025</a:t>
             </a:fld>
             <a:endParaRPr lang="ru-RU"/>
           </a:p>
@@ -29424,7 +30184,7 @@
           <a:p>
             <a:fld id="{6D05CBBA-D782-497D-B3B5-452762B3B9E7}" type="datetimeFigureOut">
               <a:rPr lang="ru-RU" smtClean="0"/>
-              <a:t>04.02.2025</a:t>
+              <a:t>05.02.2025</a:t>
             </a:fld>
             <a:endParaRPr lang="ru-RU"/>
           </a:p>
@@ -29701,7 +30461,7 @@
           <a:p>
             <a:fld id="{6D05CBBA-D782-497D-B3B5-452762B3B9E7}" type="datetimeFigureOut">
               <a:rPr lang="ru-RU" smtClean="0"/>
-              <a:t>04.02.2025</a:t>
+              <a:t>05.02.2025</a:t>
             </a:fld>
             <a:endParaRPr lang="ru-RU"/>
           </a:p>
@@ -29958,7 +30718,7 @@
           <a:p>
             <a:fld id="{6D05CBBA-D782-497D-B3B5-452762B3B9E7}" type="datetimeFigureOut">
               <a:rPr lang="ru-RU" smtClean="0"/>
-              <a:t>04.02.2025</a:t>
+              <a:t>05.02.2025</a:t>
             </a:fld>
             <a:endParaRPr lang="ru-RU"/>
           </a:p>
@@ -30188,7 +30948,7 @@
           <a:p>
             <a:fld id="{6D05CBBA-D782-497D-B3B5-452762B3B9E7}" type="datetimeFigureOut">
               <a:rPr lang="ru-RU" smtClean="0"/>
-              <a:t>04.02.2025</a:t>
+              <a:t>05.02.2025</a:t>
             </a:fld>
             <a:endParaRPr lang="ru-RU"/>
           </a:p>
@@ -30791,7 +31551,7 @@
           <p:cNvPr id="4" name="Заголовок 3">
             <a:extLst>
               <a:ext uri="{FF2B5EF4-FFF2-40B4-BE49-F238E27FC236}">
-                <a16:creationId xmlns="" xmlns:a16="http://schemas.microsoft.com/office/drawing/2014/main" id="{9C7DFBB1-7C5F-C76E-ABAE-6A877B11F80A}"/>
+                <a16:creationId xmlns:a16="http://schemas.microsoft.com/office/drawing/2014/main" xmlns="" id="{9C7DFBB1-7C5F-C76E-ABAE-6A877B11F80A}"/>
               </a:ext>
             </a:extLst>
           </p:cNvPr>
@@ -30869,7 +31629,7 @@
           <p:cNvPr id="12" name="Рисунок 11">
             <a:extLst>
               <a:ext uri="{FF2B5EF4-FFF2-40B4-BE49-F238E27FC236}">
-                <a16:creationId xmlns="" xmlns:a16="http://schemas.microsoft.com/office/drawing/2014/main" id="{CCEFED24-508F-36F3-29F1-24C036E2EC1C}"/>
+                <a16:creationId xmlns:a16="http://schemas.microsoft.com/office/drawing/2014/main" xmlns="" id="{CCEFED24-508F-36F3-29F1-24C036E2EC1C}"/>
               </a:ext>
             </a:extLst>
           </p:cNvPr>
@@ -30910,6 +31670,13 @@
   <p:clrMapOvr>
     <a:masterClrMapping/>
   </p:clrMapOvr>
+  <p:timing>
+    <p:tnLst>
+      <p:par>
+        <p:cTn id="1" dur="indefinite" restart="never" nodeType="tmRoot"/>
+      </p:par>
+    </p:tnLst>
+  </p:timing>
 </p:sld>
 </file>
 
@@ -30935,7 +31702,7 @@
           <p:cNvPr id="2" name="Заголовок 1">
             <a:extLst>
               <a:ext uri="{FF2B5EF4-FFF2-40B4-BE49-F238E27FC236}">
-                <a16:creationId xmlns="" xmlns:a16="http://schemas.microsoft.com/office/drawing/2014/main" id="{F9A2C4CE-E016-E239-B40A-B2269830C351}"/>
+                <a16:creationId xmlns:a16="http://schemas.microsoft.com/office/drawing/2014/main" xmlns="" id="{F9A2C4CE-E016-E239-B40A-B2269830C351}"/>
               </a:ext>
             </a:extLst>
           </p:cNvPr>
@@ -31392,7 +32159,7 @@
           <p:cNvPr id="2" name="Заголовок 1">
             <a:extLst>
               <a:ext uri="{FF2B5EF4-FFF2-40B4-BE49-F238E27FC236}">
-                <a16:creationId xmlns="" xmlns:a16="http://schemas.microsoft.com/office/drawing/2014/main" id="{F9A2C4CE-E016-E239-B40A-B2269830C351}"/>
+                <a16:creationId xmlns:a16="http://schemas.microsoft.com/office/drawing/2014/main" xmlns="" id="{F9A2C4CE-E016-E239-B40A-B2269830C351}"/>
               </a:ext>
             </a:extLst>
           </p:cNvPr>
@@ -31624,7 +32391,7 @@
           <p:cNvPr id="2" name="Заголовок 1">
             <a:extLst>
               <a:ext uri="{FF2B5EF4-FFF2-40B4-BE49-F238E27FC236}">
-                <a16:creationId xmlns="" xmlns:a16="http://schemas.microsoft.com/office/drawing/2014/main" id="{F9A2C4CE-E016-E239-B40A-B2269830C351}"/>
+                <a16:creationId xmlns:a16="http://schemas.microsoft.com/office/drawing/2014/main" xmlns="" id="{F9A2C4CE-E016-E239-B40A-B2269830C351}"/>
               </a:ext>
             </a:extLst>
           </p:cNvPr>
@@ -32784,7 +33551,7 @@
           <p:cNvPr id="2" name="Заголовок 1">
             <a:extLst>
               <a:ext uri="{FF2B5EF4-FFF2-40B4-BE49-F238E27FC236}">
-                <a16:creationId xmlns="" xmlns:a16="http://schemas.microsoft.com/office/drawing/2014/main" id="{F9A2C4CE-E016-E239-B40A-B2269830C351}"/>
+                <a16:creationId xmlns:a16="http://schemas.microsoft.com/office/drawing/2014/main" xmlns="" id="{F9A2C4CE-E016-E239-B40A-B2269830C351}"/>
               </a:ext>
             </a:extLst>
           </p:cNvPr>
@@ -32845,7 +33612,7 @@
           <p:cNvPr id="6" name="Рисунок 5">
             <a:extLst>
               <a:ext uri="{FF2B5EF4-FFF2-40B4-BE49-F238E27FC236}">
-                <a16:creationId xmlns="" xmlns:a16="http://schemas.microsoft.com/office/drawing/2014/main" id="{A72B82A8-6B69-B09C-A14C-0DAFED81DB6C}"/>
+                <a16:creationId xmlns:a16="http://schemas.microsoft.com/office/drawing/2014/main" xmlns="" id="{A72B82A8-6B69-B09C-A14C-0DAFED81DB6C}"/>
               </a:ext>
             </a:extLst>
           </p:cNvPr>
@@ -32881,7 +33648,7 @@
           <p:cNvPr id="7" name="TextBox 6">
             <a:extLst>
               <a:ext uri="{FF2B5EF4-FFF2-40B4-BE49-F238E27FC236}">
-                <a16:creationId xmlns="" xmlns:a16="http://schemas.microsoft.com/office/drawing/2014/main" id="{852C1C50-D43B-453D-59F2-32F10DC37D3B}"/>
+                <a16:creationId xmlns:a16="http://schemas.microsoft.com/office/drawing/2014/main" xmlns="" id="{852C1C50-D43B-453D-59F2-32F10DC37D3B}"/>
               </a:ext>
             </a:extLst>
           </p:cNvPr>
@@ -33105,7 +33872,7 @@
           <p:cNvPr id="2" name="Заголовок 1">
             <a:extLst>
               <a:ext uri="{FF2B5EF4-FFF2-40B4-BE49-F238E27FC236}">
-                <a16:creationId xmlns="" xmlns:a16="http://schemas.microsoft.com/office/drawing/2014/main" id="{F9A2C4CE-E016-E239-B40A-B2269830C351}"/>
+                <a16:creationId xmlns:a16="http://schemas.microsoft.com/office/drawing/2014/main" xmlns="" id="{F9A2C4CE-E016-E239-B40A-B2269830C351}"/>
               </a:ext>
             </a:extLst>
           </p:cNvPr>
@@ -33163,7 +33930,7 @@
           <p:cNvPr id="3" name="Таблица 2">
             <a:extLst>
               <a:ext uri="{FF2B5EF4-FFF2-40B4-BE49-F238E27FC236}">
-                <a16:creationId xmlns="" xmlns:a16="http://schemas.microsoft.com/office/drawing/2014/main" id="{02AC3759-D0B4-8D76-F254-1B31C45E2E2C}"/>
+                <a16:creationId xmlns:a16="http://schemas.microsoft.com/office/drawing/2014/main" xmlns="" id="{02AC3759-D0B4-8D76-F254-1B31C45E2E2C}"/>
               </a:ext>
             </a:extLst>
           </p:cNvPr>
@@ -33190,14 +33957,14 @@
                 <a:gridCol w="2815092">
                   <a:extLst>
                     <a:ext uri="{9D8B030D-6E8A-4147-A177-3AD203B41FA5}">
-                      <a16:colId xmlns="" xmlns:a16="http://schemas.microsoft.com/office/drawing/2014/main" val="3157637562"/>
+                      <a16:colId xmlns:a16="http://schemas.microsoft.com/office/drawing/2014/main" xmlns="" val="3157637562"/>
                     </a:ext>
                   </a:extLst>
                 </a:gridCol>
                 <a:gridCol w="7837714">
                   <a:extLst>
                     <a:ext uri="{9D8B030D-6E8A-4147-A177-3AD203B41FA5}">
-                      <a16:colId xmlns="" xmlns:a16="http://schemas.microsoft.com/office/drawing/2014/main" val="2836077444"/>
+                      <a16:colId xmlns:a16="http://schemas.microsoft.com/office/drawing/2014/main" xmlns="" val="2836077444"/>
                     </a:ext>
                   </a:extLst>
                 </a:gridCol>
@@ -33347,7 +34114,7 @@
                 </a:tc>
                 <a:extLst>
                   <a:ext uri="{0D108BD9-81ED-4DB2-BD59-A6C34878D82A}">
-                    <a16:rowId xmlns="" xmlns:a16="http://schemas.microsoft.com/office/drawing/2014/main" val="2662459142"/>
+                    <a16:rowId xmlns:a16="http://schemas.microsoft.com/office/drawing/2014/main" xmlns="" val="2662459142"/>
                   </a:ext>
                 </a:extLst>
               </a:tr>
@@ -33523,7 +34290,7 @@
                 </a:tc>
                 <a:extLst>
                   <a:ext uri="{0D108BD9-81ED-4DB2-BD59-A6C34878D82A}">
-                    <a16:rowId xmlns="" xmlns:a16="http://schemas.microsoft.com/office/drawing/2014/main" val="1282064119"/>
+                    <a16:rowId xmlns:a16="http://schemas.microsoft.com/office/drawing/2014/main" xmlns="" val="1282064119"/>
                   </a:ext>
                 </a:extLst>
               </a:tr>
@@ -33699,7 +34466,7 @@
                 </a:tc>
                 <a:extLst>
                   <a:ext uri="{0D108BD9-81ED-4DB2-BD59-A6C34878D82A}">
-                    <a16:rowId xmlns="" xmlns:a16="http://schemas.microsoft.com/office/drawing/2014/main" val="2653728797"/>
+                    <a16:rowId xmlns:a16="http://schemas.microsoft.com/office/drawing/2014/main" xmlns="" val="2653728797"/>
                   </a:ext>
                 </a:extLst>
               </a:tr>
@@ -33875,7 +34642,7 @@
                 </a:tc>
                 <a:extLst>
                   <a:ext uri="{0D108BD9-81ED-4DB2-BD59-A6C34878D82A}">
-                    <a16:rowId xmlns="" xmlns:a16="http://schemas.microsoft.com/office/drawing/2014/main" val="234017061"/>
+                    <a16:rowId xmlns:a16="http://schemas.microsoft.com/office/drawing/2014/main" xmlns="" val="234017061"/>
                   </a:ext>
                 </a:extLst>
               </a:tr>
@@ -34051,7 +34818,7 @@
                 </a:tc>
                 <a:extLst>
                   <a:ext uri="{0D108BD9-81ED-4DB2-BD59-A6C34878D82A}">
-                    <a16:rowId xmlns="" xmlns:a16="http://schemas.microsoft.com/office/drawing/2014/main" val="2450366081"/>
+                    <a16:rowId xmlns:a16="http://schemas.microsoft.com/office/drawing/2014/main" xmlns="" val="2450366081"/>
                   </a:ext>
                 </a:extLst>
               </a:tr>
@@ -34227,7 +34994,7 @@
                 </a:tc>
                 <a:extLst>
                   <a:ext uri="{0D108BD9-81ED-4DB2-BD59-A6C34878D82A}">
-                    <a16:rowId xmlns="" xmlns:a16="http://schemas.microsoft.com/office/drawing/2014/main" val="1910083205"/>
+                    <a16:rowId xmlns:a16="http://schemas.microsoft.com/office/drawing/2014/main" xmlns="" val="1910083205"/>
                   </a:ext>
                 </a:extLst>
               </a:tr>
@@ -34403,7 +35170,7 @@
                 </a:tc>
                 <a:extLst>
                   <a:ext uri="{0D108BD9-81ED-4DB2-BD59-A6C34878D82A}">
-                    <a16:rowId xmlns="" xmlns:a16="http://schemas.microsoft.com/office/drawing/2014/main" val="2515677601"/>
+                    <a16:rowId xmlns:a16="http://schemas.microsoft.com/office/drawing/2014/main" xmlns="" val="2515677601"/>
                   </a:ext>
                 </a:extLst>
               </a:tr>
@@ -34567,7 +35334,7 @@
                 </a:tc>
                 <a:extLst>
                   <a:ext uri="{0D108BD9-81ED-4DB2-BD59-A6C34878D82A}">
-                    <a16:rowId xmlns="" xmlns:a16="http://schemas.microsoft.com/office/drawing/2014/main" val="3461122430"/>
+                    <a16:rowId xmlns:a16="http://schemas.microsoft.com/office/drawing/2014/main" xmlns="" val="3461122430"/>
                   </a:ext>
                 </a:extLst>
               </a:tr>
@@ -34743,7 +35510,7 @@
                 </a:tc>
                 <a:extLst>
                   <a:ext uri="{0D108BD9-81ED-4DB2-BD59-A6C34878D82A}">
-                    <a16:rowId xmlns="" xmlns:a16="http://schemas.microsoft.com/office/drawing/2014/main" val="3671542690"/>
+                    <a16:rowId xmlns:a16="http://schemas.microsoft.com/office/drawing/2014/main" xmlns="" val="3671542690"/>
                   </a:ext>
                 </a:extLst>
               </a:tr>
@@ -34907,7 +35674,7 @@
                 </a:tc>
                 <a:extLst>
                   <a:ext uri="{0D108BD9-81ED-4DB2-BD59-A6C34878D82A}">
-                    <a16:rowId xmlns="" xmlns:a16="http://schemas.microsoft.com/office/drawing/2014/main" val="1592899344"/>
+                    <a16:rowId xmlns:a16="http://schemas.microsoft.com/office/drawing/2014/main" xmlns="" val="1592899344"/>
                   </a:ext>
                 </a:extLst>
               </a:tr>
@@ -35083,7 +35850,7 @@
                 </a:tc>
                 <a:extLst>
                   <a:ext uri="{0D108BD9-81ED-4DB2-BD59-A6C34878D82A}">
-                    <a16:rowId xmlns="" xmlns:a16="http://schemas.microsoft.com/office/drawing/2014/main" val="1650272500"/>
+                    <a16:rowId xmlns:a16="http://schemas.microsoft.com/office/drawing/2014/main" xmlns="" val="1650272500"/>
                   </a:ext>
                 </a:extLst>
               </a:tr>
@@ -35238,7 +36005,7 @@
                 </a:tc>
                 <a:extLst>
                   <a:ext uri="{0D108BD9-81ED-4DB2-BD59-A6C34878D82A}">
-                    <a16:rowId xmlns="" xmlns:a16="http://schemas.microsoft.com/office/drawing/2014/main" val="2038732419"/>
+                    <a16:rowId xmlns:a16="http://schemas.microsoft.com/office/drawing/2014/main" xmlns="" val="2038732419"/>
                   </a:ext>
                 </a:extLst>
               </a:tr>
@@ -35402,7 +36169,7 @@
                 </a:tc>
                 <a:extLst>
                   <a:ext uri="{0D108BD9-81ED-4DB2-BD59-A6C34878D82A}">
-                    <a16:rowId xmlns="" xmlns:a16="http://schemas.microsoft.com/office/drawing/2014/main" val="1878408025"/>
+                    <a16:rowId xmlns:a16="http://schemas.microsoft.com/office/drawing/2014/main" xmlns="" val="1878408025"/>
                   </a:ext>
                 </a:extLst>
               </a:tr>
@@ -35578,7 +36345,7 @@
                 </a:tc>
                 <a:extLst>
                   <a:ext uri="{0D108BD9-81ED-4DB2-BD59-A6C34878D82A}">
-                    <a16:rowId xmlns="" xmlns:a16="http://schemas.microsoft.com/office/drawing/2014/main" val="968020505"/>
+                    <a16:rowId xmlns:a16="http://schemas.microsoft.com/office/drawing/2014/main" xmlns="" val="968020505"/>
                   </a:ext>
                 </a:extLst>
               </a:tr>
@@ -35621,7 +36388,7 @@
           <p:cNvPr id="2" name="Заголовок 1">
             <a:extLst>
               <a:ext uri="{FF2B5EF4-FFF2-40B4-BE49-F238E27FC236}">
-                <a16:creationId xmlns="" xmlns:a16="http://schemas.microsoft.com/office/drawing/2014/main" id="{F9A2C4CE-E016-E239-B40A-B2269830C351}"/>
+                <a16:creationId xmlns:a16="http://schemas.microsoft.com/office/drawing/2014/main" xmlns="" id="{F9A2C4CE-E016-E239-B40A-B2269830C351}"/>
               </a:ext>
             </a:extLst>
           </p:cNvPr>
@@ -35961,7 +36728,7 @@
           <p:cNvPr id="2" name="Заголовок 1">
             <a:extLst>
               <a:ext uri="{FF2B5EF4-FFF2-40B4-BE49-F238E27FC236}">
-                <a16:creationId xmlns="" xmlns:a16="http://schemas.microsoft.com/office/drawing/2014/main" id="{F9A2C4CE-E016-E239-B40A-B2269830C351}"/>
+                <a16:creationId xmlns:a16="http://schemas.microsoft.com/office/drawing/2014/main" xmlns="" id="{F9A2C4CE-E016-E239-B40A-B2269830C351}"/>
               </a:ext>
             </a:extLst>
           </p:cNvPr>
@@ -36593,7 +37360,7 @@
           <p:cNvPr id="6" name="Рисунок 5">
             <a:extLst>
               <a:ext uri="{FF2B5EF4-FFF2-40B4-BE49-F238E27FC236}">
-                <a16:creationId xmlns="" xmlns:a16="http://schemas.microsoft.com/office/drawing/2014/main" id="{DD9D037B-14FA-D124-4EC9-D39B703011CD}"/>
+                <a16:creationId xmlns:a16="http://schemas.microsoft.com/office/drawing/2014/main" xmlns="" id="{DD9D037B-14FA-D124-4EC9-D39B703011CD}"/>
               </a:ext>
             </a:extLst>
           </p:cNvPr>
@@ -36629,7 +37396,7 @@
           <p:cNvPr id="9" name="Заголовок 8">
             <a:extLst>
               <a:ext uri="{FF2B5EF4-FFF2-40B4-BE49-F238E27FC236}">
-                <a16:creationId xmlns="" xmlns:a16="http://schemas.microsoft.com/office/drawing/2014/main" id="{DF878FEC-44A2-FA4D-209E-B9DDCFCB360B}"/>
+                <a16:creationId xmlns:a16="http://schemas.microsoft.com/office/drawing/2014/main" xmlns="" id="{DF878FEC-44A2-FA4D-209E-B9DDCFCB360B}"/>
               </a:ext>
             </a:extLst>
           </p:cNvPr>
@@ -36681,6 +37448,13 @@
   <p:clrMapOvr>
     <a:masterClrMapping/>
   </p:clrMapOvr>
+  <p:timing>
+    <p:tnLst>
+      <p:par>
+        <p:cTn id="1" dur="indefinite" restart="never" nodeType="tmRoot"/>
+      </p:par>
+    </p:tnLst>
+  </p:timing>
 </p:sld>
 </file>
 
@@ -36706,7 +37480,7 @@
           <p:cNvPr id="2" name="Заголовок 1">
             <a:extLst>
               <a:ext uri="{FF2B5EF4-FFF2-40B4-BE49-F238E27FC236}">
-                <a16:creationId xmlns="" xmlns:a16="http://schemas.microsoft.com/office/drawing/2014/main" id="{F9A2C4CE-E016-E239-B40A-B2269830C351}"/>
+                <a16:creationId xmlns:a16="http://schemas.microsoft.com/office/drawing/2014/main" xmlns="" id="{F9A2C4CE-E016-E239-B40A-B2269830C351}"/>
               </a:ext>
             </a:extLst>
           </p:cNvPr>
@@ -37106,7 +37880,7 @@
           <p:cNvPr id="2" name="Заголовок 1">
             <a:extLst>
               <a:ext uri="{FF2B5EF4-FFF2-40B4-BE49-F238E27FC236}">
-                <a16:creationId xmlns="" xmlns:a16="http://schemas.microsoft.com/office/drawing/2014/main" id="{F9A2C4CE-E016-E239-B40A-B2269830C351}"/>
+                <a16:creationId xmlns:a16="http://schemas.microsoft.com/office/drawing/2014/main" xmlns="" id="{F9A2C4CE-E016-E239-B40A-B2269830C351}"/>
               </a:ext>
             </a:extLst>
           </p:cNvPr>
@@ -37420,7 +38194,7 @@
           <p:cNvPr id="2" name="Заголовок 1">
             <a:extLst>
               <a:ext uri="{FF2B5EF4-FFF2-40B4-BE49-F238E27FC236}">
-                <a16:creationId xmlns="" xmlns:a16="http://schemas.microsoft.com/office/drawing/2014/main" id="{F9A2C4CE-E016-E239-B40A-B2269830C351}"/>
+                <a16:creationId xmlns:a16="http://schemas.microsoft.com/office/drawing/2014/main" xmlns="" id="{F9A2C4CE-E016-E239-B40A-B2269830C351}"/>
               </a:ext>
             </a:extLst>
           </p:cNvPr>
@@ -37850,7 +38624,7 @@
           <p:cNvPr id="2" name="Заголовок 1">
             <a:extLst>
               <a:ext uri="{FF2B5EF4-FFF2-40B4-BE49-F238E27FC236}">
-                <a16:creationId xmlns="" xmlns:a16="http://schemas.microsoft.com/office/drawing/2014/main" id="{F9A2C4CE-E016-E239-B40A-B2269830C351}"/>
+                <a16:creationId xmlns:a16="http://schemas.microsoft.com/office/drawing/2014/main" xmlns="" id="{F9A2C4CE-E016-E239-B40A-B2269830C351}"/>
               </a:ext>
             </a:extLst>
           </p:cNvPr>
@@ -38288,7 +39062,7 @@
           <p:cNvPr id="2" name="Заголовок 1">
             <a:extLst>
               <a:ext uri="{FF2B5EF4-FFF2-40B4-BE49-F238E27FC236}">
-                <a16:creationId xmlns="" xmlns:a16="http://schemas.microsoft.com/office/drawing/2014/main" id="{F9A2C4CE-E016-E239-B40A-B2269830C351}"/>
+                <a16:creationId xmlns:a16="http://schemas.microsoft.com/office/drawing/2014/main" xmlns="" id="{F9A2C4CE-E016-E239-B40A-B2269830C351}"/>
               </a:ext>
             </a:extLst>
           </p:cNvPr>
@@ -38719,7 +39493,7 @@
           <p:cNvPr id="2" name="Заголовок 1">
             <a:extLst>
               <a:ext uri="{FF2B5EF4-FFF2-40B4-BE49-F238E27FC236}">
-                <a16:creationId xmlns="" xmlns:a16="http://schemas.microsoft.com/office/drawing/2014/main" id="{F9A2C4CE-E016-E239-B40A-B2269830C351}"/>
+                <a16:creationId xmlns:a16="http://schemas.microsoft.com/office/drawing/2014/main" xmlns="" id="{F9A2C4CE-E016-E239-B40A-B2269830C351}"/>
               </a:ext>
             </a:extLst>
           </p:cNvPr>
@@ -39069,7 +39843,7 @@
           <p:cNvPr id="2" name="Заголовок 1">
             <a:extLst>
               <a:ext uri="{FF2B5EF4-FFF2-40B4-BE49-F238E27FC236}">
-                <a16:creationId xmlns="" xmlns:a16="http://schemas.microsoft.com/office/drawing/2014/main" id="{F9A2C4CE-E016-E239-B40A-B2269830C351}"/>
+                <a16:creationId xmlns:a16="http://schemas.microsoft.com/office/drawing/2014/main" xmlns="" id="{F9A2C4CE-E016-E239-B40A-B2269830C351}"/>
               </a:ext>
             </a:extLst>
           </p:cNvPr>
@@ -39790,7 +40564,7 @@
           <p:cNvPr id="2" name="Заголовок 1">
             <a:extLst>
               <a:ext uri="{FF2B5EF4-FFF2-40B4-BE49-F238E27FC236}">
-                <a16:creationId xmlns="" xmlns:a16="http://schemas.microsoft.com/office/drawing/2014/main" id="{F9A2C4CE-E016-E239-B40A-B2269830C351}"/>
+                <a16:creationId xmlns:a16="http://schemas.microsoft.com/office/drawing/2014/main" xmlns="" id="{F9A2C4CE-E016-E239-B40A-B2269830C351}"/>
               </a:ext>
             </a:extLst>
           </p:cNvPr>
@@ -40609,7 +41383,7 @@
           <p:cNvPr id="2" name="Заголовок 1">
             <a:extLst>
               <a:ext uri="{FF2B5EF4-FFF2-40B4-BE49-F238E27FC236}">
-                <a16:creationId xmlns="" xmlns:a16="http://schemas.microsoft.com/office/drawing/2014/main" id="{F9A2C4CE-E016-E239-B40A-B2269830C351}"/>
+                <a16:creationId xmlns:a16="http://schemas.microsoft.com/office/drawing/2014/main" xmlns="" id="{F9A2C4CE-E016-E239-B40A-B2269830C351}"/>
               </a:ext>
             </a:extLst>
           </p:cNvPr>
@@ -40938,7 +41712,7 @@
           <p:cNvPr id="2" name="Заголовок 1">
             <a:extLst>
               <a:ext uri="{FF2B5EF4-FFF2-40B4-BE49-F238E27FC236}">
-                <a16:creationId xmlns="" xmlns:a16="http://schemas.microsoft.com/office/drawing/2014/main" id="{F9A2C4CE-E016-E239-B40A-B2269830C351}"/>
+                <a16:creationId xmlns:a16="http://schemas.microsoft.com/office/drawing/2014/main" xmlns="" id="{F9A2C4CE-E016-E239-B40A-B2269830C351}"/>
               </a:ext>
             </a:extLst>
           </p:cNvPr>
@@ -41301,7 +42075,7 @@
           <p:cNvPr id="9" name="Заголовок 8">
             <a:extLst>
               <a:ext uri="{FF2B5EF4-FFF2-40B4-BE49-F238E27FC236}">
-                <a16:creationId xmlns="" xmlns:a16="http://schemas.microsoft.com/office/drawing/2014/main" id="{DF878FEC-44A2-FA4D-209E-B9DDCFCB360B}"/>
+                <a16:creationId xmlns:a16="http://schemas.microsoft.com/office/drawing/2014/main" xmlns="" id="{DF878FEC-44A2-FA4D-209E-B9DDCFCB360B}"/>
               </a:ext>
             </a:extLst>
           </p:cNvPr>
@@ -41424,6 +42198,13 @@
   <p:clrMapOvr>
     <a:masterClrMapping/>
   </p:clrMapOvr>
+  <p:timing>
+    <p:tnLst>
+      <p:par>
+        <p:cTn id="1" dur="indefinite" restart="never" nodeType="tmRoot"/>
+      </p:par>
+    </p:tnLst>
+  </p:timing>
 </p:sld>
 </file>
 
@@ -41449,7 +42230,7 @@
           <p:cNvPr id="2" name="Заголовок 1">
             <a:extLst>
               <a:ext uri="{FF2B5EF4-FFF2-40B4-BE49-F238E27FC236}">
-                <a16:creationId xmlns="" xmlns:a16="http://schemas.microsoft.com/office/drawing/2014/main" id="{F9A2C4CE-E016-E239-B40A-B2269830C351}"/>
+                <a16:creationId xmlns:a16="http://schemas.microsoft.com/office/drawing/2014/main" xmlns="" id="{F9A2C4CE-E016-E239-B40A-B2269830C351}"/>
               </a:ext>
             </a:extLst>
           </p:cNvPr>
@@ -41771,7 +42552,7 @@
           <p:cNvPr id="2" name="Заголовок 1">
             <a:extLst>
               <a:ext uri="{FF2B5EF4-FFF2-40B4-BE49-F238E27FC236}">
-                <a16:creationId xmlns="" xmlns:a16="http://schemas.microsoft.com/office/drawing/2014/main" id="{F9A2C4CE-E016-E239-B40A-B2269830C351}"/>
+                <a16:creationId xmlns:a16="http://schemas.microsoft.com/office/drawing/2014/main" xmlns="" id="{F9A2C4CE-E016-E239-B40A-B2269830C351}"/>
               </a:ext>
             </a:extLst>
           </p:cNvPr>
@@ -42204,7 +42985,7 @@
           <p:cNvPr id="2" name="Заголовок 1">
             <a:extLst>
               <a:ext uri="{FF2B5EF4-FFF2-40B4-BE49-F238E27FC236}">
-                <a16:creationId xmlns="" xmlns:a16="http://schemas.microsoft.com/office/drawing/2014/main" id="{F9A2C4CE-E016-E239-B40A-B2269830C351}"/>
+                <a16:creationId xmlns:a16="http://schemas.microsoft.com/office/drawing/2014/main" xmlns="" id="{F9A2C4CE-E016-E239-B40A-B2269830C351}"/>
               </a:ext>
             </a:extLst>
           </p:cNvPr>
@@ -42550,7 +43331,7 @@
           <p:cNvPr id="2" name="Заголовок 1">
             <a:extLst>
               <a:ext uri="{FF2B5EF4-FFF2-40B4-BE49-F238E27FC236}">
-                <a16:creationId xmlns="" xmlns:a16="http://schemas.microsoft.com/office/drawing/2014/main" id="{F9A2C4CE-E016-E239-B40A-B2269830C351}"/>
+                <a16:creationId xmlns:a16="http://schemas.microsoft.com/office/drawing/2014/main" xmlns="" id="{F9A2C4CE-E016-E239-B40A-B2269830C351}"/>
               </a:ext>
             </a:extLst>
           </p:cNvPr>
@@ -42818,7 +43599,7 @@
           <p:cNvPr id="2" name="Заголовок 1">
             <a:extLst>
               <a:ext uri="{FF2B5EF4-FFF2-40B4-BE49-F238E27FC236}">
-                <a16:creationId xmlns="" xmlns:a16="http://schemas.microsoft.com/office/drawing/2014/main" id="{F9A2C4CE-E016-E239-B40A-B2269830C351}"/>
+                <a16:creationId xmlns:a16="http://schemas.microsoft.com/office/drawing/2014/main" xmlns="" id="{F9A2C4CE-E016-E239-B40A-B2269830C351}"/>
               </a:ext>
             </a:extLst>
           </p:cNvPr>
@@ -43095,7 +43876,7 @@
           <p:cNvPr id="2" name="Заголовок 1">
             <a:extLst>
               <a:ext uri="{FF2B5EF4-FFF2-40B4-BE49-F238E27FC236}">
-                <a16:creationId xmlns="" xmlns:a16="http://schemas.microsoft.com/office/drawing/2014/main" id="{F9A2C4CE-E016-E239-B40A-B2269830C351}"/>
+                <a16:creationId xmlns:a16="http://schemas.microsoft.com/office/drawing/2014/main" xmlns="" id="{F9A2C4CE-E016-E239-B40A-B2269830C351}"/>
               </a:ext>
             </a:extLst>
           </p:cNvPr>
@@ -43289,7 +44070,7 @@
           <p:cNvPr id="2" name="Заголовок 1">
             <a:extLst>
               <a:ext uri="{FF2B5EF4-FFF2-40B4-BE49-F238E27FC236}">
-                <a16:creationId xmlns="" xmlns:a16="http://schemas.microsoft.com/office/drawing/2014/main" id="{F9A2C4CE-E016-E239-B40A-B2269830C351}"/>
+                <a16:creationId xmlns:a16="http://schemas.microsoft.com/office/drawing/2014/main" xmlns="" id="{F9A2C4CE-E016-E239-B40A-B2269830C351}"/>
               </a:ext>
             </a:extLst>
           </p:cNvPr>
@@ -43575,7 +44356,7 @@
           <p:cNvPr id="2" name="Заголовок 1">
             <a:extLst>
               <a:ext uri="{FF2B5EF4-FFF2-40B4-BE49-F238E27FC236}">
-                <a16:creationId xmlns="" xmlns:a16="http://schemas.microsoft.com/office/drawing/2014/main" id="{F9A2C4CE-E016-E239-B40A-B2269830C351}"/>
+                <a16:creationId xmlns:a16="http://schemas.microsoft.com/office/drawing/2014/main" xmlns="" id="{F9A2C4CE-E016-E239-B40A-B2269830C351}"/>
               </a:ext>
             </a:extLst>
           </p:cNvPr>
@@ -43787,7 +44568,7 @@
           <p:cNvPr id="2" name="Заголовок 1">
             <a:extLst>
               <a:ext uri="{FF2B5EF4-FFF2-40B4-BE49-F238E27FC236}">
-                <a16:creationId xmlns="" xmlns:a16="http://schemas.microsoft.com/office/drawing/2014/main" id="{F9A2C4CE-E016-E239-B40A-B2269830C351}"/>
+                <a16:creationId xmlns:a16="http://schemas.microsoft.com/office/drawing/2014/main" xmlns="" id="{F9A2C4CE-E016-E239-B40A-B2269830C351}"/>
               </a:ext>
             </a:extLst>
           </p:cNvPr>
@@ -44050,7 +44831,7 @@
           <p:cNvPr id="2" name="Заголовок 1">
             <a:extLst>
               <a:ext uri="{FF2B5EF4-FFF2-40B4-BE49-F238E27FC236}">
-                <a16:creationId xmlns="" xmlns:a16="http://schemas.microsoft.com/office/drawing/2014/main" id="{F9A2C4CE-E016-E239-B40A-B2269830C351}"/>
+                <a16:creationId xmlns:a16="http://schemas.microsoft.com/office/drawing/2014/main" xmlns="" id="{F9A2C4CE-E016-E239-B40A-B2269830C351}"/>
               </a:ext>
             </a:extLst>
           </p:cNvPr>
@@ -44418,7 +45199,7 @@
           <p:cNvPr id="9" name="Заголовок 8">
             <a:extLst>
               <a:ext uri="{FF2B5EF4-FFF2-40B4-BE49-F238E27FC236}">
-                <a16:creationId xmlns="" xmlns:a16="http://schemas.microsoft.com/office/drawing/2014/main" id="{DF878FEC-44A2-FA4D-209E-B9DDCFCB360B}"/>
+                <a16:creationId xmlns:a16="http://schemas.microsoft.com/office/drawing/2014/main" xmlns="" id="{DF878FEC-44A2-FA4D-209E-B9DDCFCB360B}"/>
               </a:ext>
             </a:extLst>
           </p:cNvPr>
@@ -44602,6 +45383,13 @@
   <p:clrMapOvr>
     <a:masterClrMapping/>
   </p:clrMapOvr>
+  <p:timing>
+    <p:tnLst>
+      <p:par>
+        <p:cTn id="1" dur="indefinite" restart="never" nodeType="tmRoot"/>
+      </p:par>
+    </p:tnLst>
+  </p:timing>
 </p:sld>
 </file>
 
@@ -44627,7 +45415,7 @@
           <p:cNvPr id="2" name="Заголовок 1">
             <a:extLst>
               <a:ext uri="{FF2B5EF4-FFF2-40B4-BE49-F238E27FC236}">
-                <a16:creationId xmlns="" xmlns:a16="http://schemas.microsoft.com/office/drawing/2014/main" id="{F9A2C4CE-E016-E239-B40A-B2269830C351}"/>
+                <a16:creationId xmlns:a16="http://schemas.microsoft.com/office/drawing/2014/main" xmlns="" id="{F9A2C4CE-E016-E239-B40A-B2269830C351}"/>
               </a:ext>
             </a:extLst>
           </p:cNvPr>
@@ -44894,7 +45682,7 @@
           <p:cNvPr id="2" name="Заголовок 1">
             <a:extLst>
               <a:ext uri="{FF2B5EF4-FFF2-40B4-BE49-F238E27FC236}">
-                <a16:creationId xmlns="" xmlns:a16="http://schemas.microsoft.com/office/drawing/2014/main" id="{F9A2C4CE-E016-E239-B40A-B2269830C351}"/>
+                <a16:creationId xmlns:a16="http://schemas.microsoft.com/office/drawing/2014/main" xmlns="" id="{F9A2C4CE-E016-E239-B40A-B2269830C351}"/>
               </a:ext>
             </a:extLst>
           </p:cNvPr>
@@ -45143,7 +45931,7 @@
           <p:cNvPr id="2" name="Заголовок 1">
             <a:extLst>
               <a:ext uri="{FF2B5EF4-FFF2-40B4-BE49-F238E27FC236}">
-                <a16:creationId xmlns="" xmlns:a16="http://schemas.microsoft.com/office/drawing/2014/main" id="{F9A2C4CE-E016-E239-B40A-B2269830C351}"/>
+                <a16:creationId xmlns:a16="http://schemas.microsoft.com/office/drawing/2014/main" xmlns="" id="{F9A2C4CE-E016-E239-B40A-B2269830C351}"/>
               </a:ext>
             </a:extLst>
           </p:cNvPr>
@@ -45467,7 +46255,7 @@
           <p:cNvPr id="2" name="Заголовок 1">
             <a:extLst>
               <a:ext uri="{FF2B5EF4-FFF2-40B4-BE49-F238E27FC236}">
-                <a16:creationId xmlns="" xmlns:a16="http://schemas.microsoft.com/office/drawing/2014/main" id="{F9A2C4CE-E016-E239-B40A-B2269830C351}"/>
+                <a16:creationId xmlns:a16="http://schemas.microsoft.com/office/drawing/2014/main" xmlns="" id="{F9A2C4CE-E016-E239-B40A-B2269830C351}"/>
               </a:ext>
             </a:extLst>
           </p:cNvPr>
@@ -46017,7 +46805,7 @@
           <p:cNvPr id="2" name="Заголовок 1">
             <a:extLst>
               <a:ext uri="{FF2B5EF4-FFF2-40B4-BE49-F238E27FC236}">
-                <a16:creationId xmlns="" xmlns:a16="http://schemas.microsoft.com/office/drawing/2014/main" id="{F9A2C4CE-E016-E239-B40A-B2269830C351}"/>
+                <a16:creationId xmlns:a16="http://schemas.microsoft.com/office/drawing/2014/main" xmlns="" id="{F9A2C4CE-E016-E239-B40A-B2269830C351}"/>
               </a:ext>
             </a:extLst>
           </p:cNvPr>
@@ -46169,7 +46957,7 @@
           <p:cNvPr id="2" name="Заголовок 1">
             <a:extLst>
               <a:ext uri="{FF2B5EF4-FFF2-40B4-BE49-F238E27FC236}">
-                <a16:creationId xmlns="" xmlns:a16="http://schemas.microsoft.com/office/drawing/2014/main" id="{F9A2C4CE-E016-E239-B40A-B2269830C351}"/>
+                <a16:creationId xmlns:a16="http://schemas.microsoft.com/office/drawing/2014/main" xmlns="" id="{F9A2C4CE-E016-E239-B40A-B2269830C351}"/>
               </a:ext>
             </a:extLst>
           </p:cNvPr>
@@ -46321,7 +47109,7 @@
           <p:cNvPr id="2" name="Заголовок 1">
             <a:extLst>
               <a:ext uri="{FF2B5EF4-FFF2-40B4-BE49-F238E27FC236}">
-                <a16:creationId xmlns="" xmlns:a16="http://schemas.microsoft.com/office/drawing/2014/main" id="{F9A2C4CE-E016-E239-B40A-B2269830C351}"/>
+                <a16:creationId xmlns:a16="http://schemas.microsoft.com/office/drawing/2014/main" xmlns="" id="{F9A2C4CE-E016-E239-B40A-B2269830C351}"/>
               </a:ext>
             </a:extLst>
           </p:cNvPr>
@@ -46601,7 +47389,7 @@
           <p:cNvPr id="2" name="Заголовок 1">
             <a:extLst>
               <a:ext uri="{FF2B5EF4-FFF2-40B4-BE49-F238E27FC236}">
-                <a16:creationId xmlns="" xmlns:a16="http://schemas.microsoft.com/office/drawing/2014/main" id="{F9A2C4CE-E016-E239-B40A-B2269830C351}"/>
+                <a16:creationId xmlns:a16="http://schemas.microsoft.com/office/drawing/2014/main" xmlns="" id="{F9A2C4CE-E016-E239-B40A-B2269830C351}"/>
               </a:ext>
             </a:extLst>
           </p:cNvPr>
@@ -46767,7 +47555,7 @@
           <p:cNvPr id="2" name="Заголовок 1">
             <a:extLst>
               <a:ext uri="{FF2B5EF4-FFF2-40B4-BE49-F238E27FC236}">
-                <a16:creationId xmlns="" xmlns:a16="http://schemas.microsoft.com/office/drawing/2014/main" id="{F9A2C4CE-E016-E239-B40A-B2269830C351}"/>
+                <a16:creationId xmlns:a16="http://schemas.microsoft.com/office/drawing/2014/main" xmlns="" id="{F9A2C4CE-E016-E239-B40A-B2269830C351}"/>
               </a:ext>
             </a:extLst>
           </p:cNvPr>
@@ -46997,7 +47785,7 @@
           <p:cNvPr id="2" name="Заголовок 1">
             <a:extLst>
               <a:ext uri="{FF2B5EF4-FFF2-40B4-BE49-F238E27FC236}">
-                <a16:creationId xmlns="" xmlns:a16="http://schemas.microsoft.com/office/drawing/2014/main" id="{F9A2C4CE-E016-E239-B40A-B2269830C351}"/>
+                <a16:creationId xmlns:a16="http://schemas.microsoft.com/office/drawing/2014/main" xmlns="" id="{F9A2C4CE-E016-E239-B40A-B2269830C351}"/>
               </a:ext>
             </a:extLst>
           </p:cNvPr>
@@ -47227,7 +48015,7 @@
           <p:cNvPr id="2" name="Заголовок 1">
             <a:extLst>
               <a:ext uri="{FF2B5EF4-FFF2-40B4-BE49-F238E27FC236}">
-                <a16:creationId xmlns="" xmlns:a16="http://schemas.microsoft.com/office/drawing/2014/main" id="{F9A2C4CE-E016-E239-B40A-B2269830C351}"/>
+                <a16:creationId xmlns:a16="http://schemas.microsoft.com/office/drawing/2014/main" xmlns="" id="{F9A2C4CE-E016-E239-B40A-B2269830C351}"/>
               </a:ext>
             </a:extLst>
           </p:cNvPr>
@@ -47437,7 +48225,7 @@
           <p:cNvPr id="2" name="Заголовок 1">
             <a:extLst>
               <a:ext uri="{FF2B5EF4-FFF2-40B4-BE49-F238E27FC236}">
-                <a16:creationId xmlns="" xmlns:a16="http://schemas.microsoft.com/office/drawing/2014/main" id="{F9A2C4CE-E016-E239-B40A-B2269830C351}"/>
+                <a16:creationId xmlns:a16="http://schemas.microsoft.com/office/drawing/2014/main" xmlns="" id="{F9A2C4CE-E016-E239-B40A-B2269830C351}"/>
               </a:ext>
             </a:extLst>
           </p:cNvPr>
@@ -47603,7 +48391,7 @@
           <p:cNvPr id="2" name="Заголовок 1">
             <a:extLst>
               <a:ext uri="{FF2B5EF4-FFF2-40B4-BE49-F238E27FC236}">
-                <a16:creationId xmlns="" xmlns:a16="http://schemas.microsoft.com/office/drawing/2014/main" id="{F9A2C4CE-E016-E239-B40A-B2269830C351}"/>
+                <a16:creationId xmlns:a16="http://schemas.microsoft.com/office/drawing/2014/main" xmlns="" id="{F9A2C4CE-E016-E239-B40A-B2269830C351}"/>
               </a:ext>
             </a:extLst>
           </p:cNvPr>
@@ -47876,7 +48664,7 @@
           <p:cNvPr id="2" name="Заголовок 1">
             <a:extLst>
               <a:ext uri="{FF2B5EF4-FFF2-40B4-BE49-F238E27FC236}">
-                <a16:creationId xmlns="" xmlns:a16="http://schemas.microsoft.com/office/drawing/2014/main" id="{F9A2C4CE-E016-E239-B40A-B2269830C351}"/>
+                <a16:creationId xmlns:a16="http://schemas.microsoft.com/office/drawing/2014/main" xmlns="" id="{F9A2C4CE-E016-E239-B40A-B2269830C351}"/>
               </a:ext>
             </a:extLst>
           </p:cNvPr>
@@ -48185,7 +48973,7 @@
           <p:cNvPr id="2" name="Заголовок 1">
             <a:extLst>
               <a:ext uri="{FF2B5EF4-FFF2-40B4-BE49-F238E27FC236}">
-                <a16:creationId xmlns="" xmlns:a16="http://schemas.microsoft.com/office/drawing/2014/main" id="{F9A2C4CE-E016-E239-B40A-B2269830C351}"/>
+                <a16:creationId xmlns:a16="http://schemas.microsoft.com/office/drawing/2014/main" xmlns="" id="{F9A2C4CE-E016-E239-B40A-B2269830C351}"/>
               </a:ext>
             </a:extLst>
           </p:cNvPr>
@@ -48401,7 +49189,7 @@
           <p:cNvPr id="2" name="Заголовок 1">
             <a:extLst>
               <a:ext uri="{FF2B5EF4-FFF2-40B4-BE49-F238E27FC236}">
-                <a16:creationId xmlns="" xmlns:a16="http://schemas.microsoft.com/office/drawing/2014/main" id="{F9A2C4CE-E016-E239-B40A-B2269830C351}"/>
+                <a16:creationId xmlns:a16="http://schemas.microsoft.com/office/drawing/2014/main" xmlns="" id="{F9A2C4CE-E016-E239-B40A-B2269830C351}"/>
               </a:ext>
             </a:extLst>
           </p:cNvPr>
@@ -48786,7 +49574,7 @@
   <a:extraClrSchemeLst/>
   <a:extLst>
     <a:ext uri="{05A4C25C-085E-4340-85A3-A5531E510DB2}">
-      <thm15:themeFamily xmlns="" xmlns:thm15="http://schemas.microsoft.com/office/thememl/2012/main" name="Office 2013 - 2022 Theme" id="{62F939B6-93AF-4DB8-9C6B-D6C7DFDC589F}" vid="{3E4F19A7-A959-40BB-972C-4880BAF8EB09}"/>
+      <thm15:themeFamily xmlns:thm15="http://schemas.microsoft.com/office/thememl/2012/main" xmlns="" name="Office 2013 - 2022 Theme" id="{62F939B6-93AF-4DB8-9C6B-D6C7DFDC589F}" vid="{3E4F19A7-A959-40BB-972C-4880BAF8EB09}"/>
     </a:ext>
   </a:extLst>
 </a:theme>
@@ -49081,7 +49869,7 @@
   <a:extraClrSchemeLst/>
   <a:extLst>
     <a:ext uri="{05A4C25C-085E-4340-85A3-A5531E510DB2}">
-      <thm15:themeFamily xmlns="" xmlns:thm15="http://schemas.microsoft.com/office/thememl/2012/main" name="Office Theme" id="{62F939B6-93AF-4DB8-9C6B-D6C7DFDC589F}" vid="{4A3C46E8-61CC-4603-A589-7422A47A8E4A}"/>
+      <thm15:themeFamily xmlns:thm15="http://schemas.microsoft.com/office/thememl/2012/main" xmlns="" name="Office Theme" id="{62F939B6-93AF-4DB8-9C6B-D6C7DFDC589F}" vid="{4A3C46E8-61CC-4603-A589-7422A47A8E4A}"/>
     </a:ext>
   </a:extLst>
 </a:theme>

</xml_diff>